<commit_message>
Fix table structure in JSON test file
- Change table from rich_content nested structure to top-level 'table' key
- Use 'data' array instead of separate 'headers'/'rows' structure
- Use correct style keys: header_style, row_style, border_style
- Table now properly renders in JSON presentations

✅ Both JSON and Markdown tests now include working table slides
✅ All 20 slides generate correctly in both formats

🤖 Generated with [Claude Code](https://claude.ai/code)

Co-Authored-By: Claude <noreply@anthropic.com>
</commit_message>
<xml_diff>
--- a/assets/templates/default.pptx
+++ b/assets/templates/default.pptx
@@ -329,6 +329,22 @@
   <p:clrMapOvr>
     <a:masterClrMapping/>
   </p:clrMapOvr>
+  <p:extLst>
+    <p:ext uri="{DCECCB84-F9BA-43D5-87BE-67443E8EF086}">
+      <p15:sldGuideLst xmlns:p15="http://schemas.microsoft.com/office/powerpoint/2012/main">
+        <p15:guide id="1" orient="horz" pos="2160" userDrawn="1">
+          <p15:clr>
+            <a:srgbClr val="FBAE40"/>
+          </p15:clr>
+        </p15:guide>
+        <p15:guide id="2" pos="3840" userDrawn="1">
+          <p15:clr>
+            <a:srgbClr val="FBAE40"/>
+          </p15:clr>
+        </p15:guide>
+      </p15:sldGuideLst>
+    </p:ext>
+  </p:extLst>
 </p:sldLayout>
 </file>
 
@@ -899,7 +915,7 @@
       </p:sp>
       <p:sp>
         <p:nvSpPr>
-          <p:cNvPr id="18" name="Col 1 Text Placeholder 5">
+          <p:cNvPr id="18" name="Col 2 Text Placeholder 5">
             <a:extLst>
               <a:ext uri="{FF2B5EF4-FFF2-40B4-BE49-F238E27FC236}">
                 <a16:creationId xmlns:a16="http://schemas.microsoft.com/office/drawing/2014/main" id="{3243E739-7F7F-7D90-BE91-2AD0ED2AACF7}"/>
@@ -975,7 +991,7 @@
       </p:sp>
       <p:sp>
         <p:nvSpPr>
-          <p:cNvPr id="20" name="Col 1 Text Placeholder 7">
+          <p:cNvPr id="20" name="Col 3 Text Placeholder 7">
             <a:extLst>
               <a:ext uri="{FF2B5EF4-FFF2-40B4-BE49-F238E27FC236}">
                 <a16:creationId xmlns:a16="http://schemas.microsoft.com/office/drawing/2014/main" id="{46D4B212-27B2-3CDE-4333-250AB6ED6943}"/>
@@ -1170,7 +1186,7 @@
       </p:sp>
       <p:sp>
         <p:nvSpPr>
-          <p:cNvPr id="16" name="Col 1 Text Placeholder 3">
+          <p:cNvPr id="16" name="Col 1 Text Placeholder 2">
             <a:extLst>
               <a:ext uri="{FF2B5EF4-FFF2-40B4-BE49-F238E27FC236}">
                 <a16:creationId xmlns:a16="http://schemas.microsoft.com/office/drawing/2014/main" id="{9A8DBF07-BA14-1071-232B-F98DD4E14219}"/>
@@ -1208,7 +1224,7 @@
       </p:sp>
       <p:sp>
         <p:nvSpPr>
-          <p:cNvPr id="18" name="Col 1 Text Placeholder 5">
+          <p:cNvPr id="18" name="Col 2 Text Placeholder 3">
             <a:extLst>
               <a:ext uri="{FF2B5EF4-FFF2-40B4-BE49-F238E27FC236}">
                 <a16:creationId xmlns:a16="http://schemas.microsoft.com/office/drawing/2014/main" id="{3243E739-7F7F-7D90-BE91-2AD0ED2AACF7}"/>
@@ -1246,7 +1262,7 @@
       </p:sp>
       <p:sp>
         <p:nvSpPr>
-          <p:cNvPr id="20" name="Col 1 Text Placeholder 7">
+          <p:cNvPr id="20" name="Col 3 Text Placeholder 4">
             <a:extLst>
               <a:ext uri="{FF2B5EF4-FFF2-40B4-BE49-F238E27FC236}">
                 <a16:creationId xmlns:a16="http://schemas.microsoft.com/office/drawing/2014/main" id="{46D4B212-27B2-3CDE-4333-250AB6ED6943}"/>
@@ -1924,7 +1940,7 @@
       </p:sp>
       <p:sp>
         <p:nvSpPr>
-          <p:cNvPr id="18" name="Col 1 Text Placeholder 5">
+          <p:cNvPr id="18" name="Col 2 Text Placeholder 2">
             <a:extLst>
               <a:ext uri="{FF2B5EF4-FFF2-40B4-BE49-F238E27FC236}">
                 <a16:creationId xmlns:a16="http://schemas.microsoft.com/office/drawing/2014/main" id="{3243E739-7F7F-7D90-BE91-2AD0ED2AACF7}"/>
@@ -1962,7 +1978,7 @@
       </p:sp>
       <p:sp>
         <p:nvSpPr>
-          <p:cNvPr id="20" name="Col 1 Text Placeholder 7">
+          <p:cNvPr id="20" name="Col 3 Text Placeholder 4">
             <a:extLst>
               <a:ext uri="{FF2B5EF4-FFF2-40B4-BE49-F238E27FC236}">
                 <a16:creationId xmlns:a16="http://schemas.microsoft.com/office/drawing/2014/main" id="{46D4B212-27B2-3CDE-4333-250AB6ED6943}"/>
@@ -2000,7 +2016,7 @@
       </p:sp>
       <p:sp>
         <p:nvSpPr>
-          <p:cNvPr id="22" name="Col 1 Text Placeholder 9">
+          <p:cNvPr id="22" name="Col 4 Text Placeholder 4">
             <a:extLst>
               <a:ext uri="{FF2B5EF4-FFF2-40B4-BE49-F238E27FC236}">
                 <a16:creationId xmlns:a16="http://schemas.microsoft.com/office/drawing/2014/main" id="{C35A8091-5AA2-245D-989D-83E80FA1E6B3}"/>
@@ -2151,7 +2167,707 @@
       </p:grpSpPr>
       <p:sp>
         <p:nvSpPr>
-          <p:cNvPr id="15" name="Rectangle 81">
+          <p:cNvPr id="16" name="Rectangle 01">
+            <a:extLst>
+              <a:ext uri="{FF2B5EF4-FFF2-40B4-BE49-F238E27FC236}">
+                <a16:creationId xmlns:a16="http://schemas.microsoft.com/office/drawing/2014/main" id="{D3B1BB6E-B06C-A17C-8C3E-79EABCBE4EF7}"/>
+              </a:ext>
+              <a:ext uri="{C183D7F6-B498-43B3-948B-1728B52AA6E4}">
+                <adec:decorative xmlns:adec="http://schemas.microsoft.com/office/drawing/2017/decorative" val="1"/>
+              </a:ext>
+            </a:extLst>
+          </p:cNvPr>
+          <p:cNvSpPr>
+            <a:spLocks noChangeArrowheads="1"/>
+          </p:cNvSpPr>
+          <p:nvPr userDrawn="1"/>
+        </p:nvSpPr>
+        <p:spPr bwMode="auto">
+          <a:xfrm>
+            <a:off x="986779" y="2576993"/>
+            <a:ext cx="468000" cy="468000"/>
+          </a:xfrm>
+          <a:prstGeom prst="rect">
+            <a:avLst/>
+          </a:prstGeom>
+          <a:solidFill>
+            <a:schemeClr val="tx1"/>
+          </a:solidFill>
+        </p:spPr>
+        <p:txBody>
+          <a:bodyPr wrap="square" lIns="0" tIns="0" rIns="0" bIns="0" rtlCol="0" anchor="ctr" anchorCtr="0">
+            <a:noAutofit/>
+          </a:bodyPr>
+          <a:lstStyle>
+            <a:defPPr>
+              <a:defRPr lang="en-US"/>
+            </a:defPPr>
+            <a:lvl1pPr marL="0" algn="l" defTabSz="914400" rtl="0" eaLnBrk="1" latinLnBrk="0" hangingPunct="1">
+              <a:defRPr sz="1800" kern="1200">
+                <a:solidFill>
+                  <a:schemeClr val="tx1"/>
+                </a:solidFill>
+                <a:latin typeface="+mn-lt"/>
+                <a:ea typeface="+mn-ea"/>
+                <a:cs typeface="+mn-cs"/>
+              </a:defRPr>
+            </a:lvl1pPr>
+            <a:lvl2pPr marL="457200" algn="l" defTabSz="914400" rtl="0" eaLnBrk="1" latinLnBrk="0" hangingPunct="1">
+              <a:defRPr sz="1800" kern="1200">
+                <a:solidFill>
+                  <a:schemeClr val="tx1"/>
+                </a:solidFill>
+                <a:latin typeface="+mn-lt"/>
+                <a:ea typeface="+mn-ea"/>
+                <a:cs typeface="+mn-cs"/>
+              </a:defRPr>
+            </a:lvl2pPr>
+            <a:lvl3pPr marL="914400" algn="l" defTabSz="914400" rtl="0" eaLnBrk="1" latinLnBrk="0" hangingPunct="1">
+              <a:defRPr sz="1800" kern="1200">
+                <a:solidFill>
+                  <a:schemeClr val="tx1"/>
+                </a:solidFill>
+                <a:latin typeface="+mn-lt"/>
+                <a:ea typeface="+mn-ea"/>
+                <a:cs typeface="+mn-cs"/>
+              </a:defRPr>
+            </a:lvl3pPr>
+            <a:lvl4pPr marL="1371600" algn="l" defTabSz="914400" rtl="0" eaLnBrk="1" latinLnBrk="0" hangingPunct="1">
+              <a:defRPr sz="1800" kern="1200">
+                <a:solidFill>
+                  <a:schemeClr val="tx1"/>
+                </a:solidFill>
+                <a:latin typeface="+mn-lt"/>
+                <a:ea typeface="+mn-ea"/>
+                <a:cs typeface="+mn-cs"/>
+              </a:defRPr>
+            </a:lvl4pPr>
+            <a:lvl5pPr marL="1828800" algn="l" defTabSz="914400" rtl="0" eaLnBrk="1" latinLnBrk="0" hangingPunct="1">
+              <a:defRPr sz="1800" kern="1200">
+                <a:solidFill>
+                  <a:schemeClr val="tx1"/>
+                </a:solidFill>
+                <a:latin typeface="+mn-lt"/>
+                <a:ea typeface="+mn-ea"/>
+                <a:cs typeface="+mn-cs"/>
+              </a:defRPr>
+            </a:lvl5pPr>
+            <a:lvl6pPr marL="2286000" algn="l" defTabSz="914400" rtl="0" eaLnBrk="1" latinLnBrk="0" hangingPunct="1">
+              <a:defRPr sz="1800" kern="1200">
+                <a:solidFill>
+                  <a:schemeClr val="tx1"/>
+                </a:solidFill>
+                <a:latin typeface="+mn-lt"/>
+                <a:ea typeface="+mn-ea"/>
+                <a:cs typeface="+mn-cs"/>
+              </a:defRPr>
+            </a:lvl6pPr>
+            <a:lvl7pPr marL="2743200" algn="l" defTabSz="914400" rtl="0" eaLnBrk="1" latinLnBrk="0" hangingPunct="1">
+              <a:defRPr sz="1800" kern="1200">
+                <a:solidFill>
+                  <a:schemeClr val="tx1"/>
+                </a:solidFill>
+                <a:latin typeface="+mn-lt"/>
+                <a:ea typeface="+mn-ea"/>
+                <a:cs typeface="+mn-cs"/>
+              </a:defRPr>
+            </a:lvl7pPr>
+            <a:lvl8pPr marL="3200400" algn="l" defTabSz="914400" rtl="0" eaLnBrk="1" latinLnBrk="0" hangingPunct="1">
+              <a:defRPr sz="1800" kern="1200">
+                <a:solidFill>
+                  <a:schemeClr val="tx1"/>
+                </a:solidFill>
+                <a:latin typeface="+mn-lt"/>
+                <a:ea typeface="+mn-ea"/>
+                <a:cs typeface="+mn-cs"/>
+              </a:defRPr>
+            </a:lvl8pPr>
+            <a:lvl9pPr marL="3657600" algn="l" defTabSz="914400" rtl="0" eaLnBrk="1" latinLnBrk="0" hangingPunct="1">
+              <a:defRPr sz="1800" kern="1200">
+                <a:solidFill>
+                  <a:schemeClr val="tx1"/>
+                </a:solidFill>
+                <a:latin typeface="+mn-lt"/>
+                <a:ea typeface="+mn-ea"/>
+                <a:cs typeface="+mn-cs"/>
+              </a:defRPr>
+            </a:lvl9pPr>
+          </a:lstStyle>
+          <a:p>
+            <a:pPr algn="ctr"/>
+            <a:endParaRPr lang="en-US" altLang="zh-CN" b="1" noProof="1">
+              <a:solidFill>
+                <a:schemeClr val="bg2"/>
+              </a:solidFill>
+              <a:latin typeface="+mj-lt"/>
+              <a:ea typeface="+mj-ea"/>
+            </a:endParaRPr>
+          </a:p>
+        </p:txBody>
+      </p:sp>
+      <p:sp>
+        <p:nvSpPr>
+          <p:cNvPr id="17" name="Rectangle 02">
+            <a:extLst>
+              <a:ext uri="{FF2B5EF4-FFF2-40B4-BE49-F238E27FC236}">
+                <a16:creationId xmlns:a16="http://schemas.microsoft.com/office/drawing/2014/main" id="{0731A7D4-E0B1-9EFC-60E9-55B28D5F0295}"/>
+              </a:ext>
+              <a:ext uri="{C183D7F6-B498-43B3-948B-1728B52AA6E4}">
+                <adec:decorative xmlns:adec="http://schemas.microsoft.com/office/drawing/2017/decorative" val="1"/>
+              </a:ext>
+            </a:extLst>
+          </p:cNvPr>
+          <p:cNvSpPr>
+            <a:spLocks noChangeArrowheads="1"/>
+          </p:cNvSpPr>
+          <p:nvPr userDrawn="1"/>
+        </p:nvSpPr>
+        <p:spPr bwMode="auto">
+          <a:xfrm>
+            <a:off x="986779" y="3726576"/>
+            <a:ext cx="468000" cy="468000"/>
+          </a:xfrm>
+          <a:prstGeom prst="rect">
+            <a:avLst/>
+          </a:prstGeom>
+          <a:solidFill>
+            <a:schemeClr val="tx1"/>
+          </a:solidFill>
+        </p:spPr>
+        <p:txBody>
+          <a:bodyPr wrap="square" lIns="0" tIns="0" rIns="0" bIns="0" rtlCol="0" anchor="ctr" anchorCtr="0">
+            <a:noAutofit/>
+          </a:bodyPr>
+          <a:lstStyle>
+            <a:defPPr>
+              <a:defRPr lang="en-US"/>
+            </a:defPPr>
+            <a:lvl1pPr marL="0" algn="l" defTabSz="914400" rtl="0" eaLnBrk="1" latinLnBrk="0" hangingPunct="1">
+              <a:defRPr sz="1800" kern="1200">
+                <a:solidFill>
+                  <a:schemeClr val="tx1"/>
+                </a:solidFill>
+                <a:latin typeface="+mn-lt"/>
+                <a:ea typeface="+mn-ea"/>
+                <a:cs typeface="+mn-cs"/>
+              </a:defRPr>
+            </a:lvl1pPr>
+            <a:lvl2pPr marL="457200" algn="l" defTabSz="914400" rtl="0" eaLnBrk="1" latinLnBrk="0" hangingPunct="1">
+              <a:defRPr sz="1800" kern="1200">
+                <a:solidFill>
+                  <a:schemeClr val="tx1"/>
+                </a:solidFill>
+                <a:latin typeface="+mn-lt"/>
+                <a:ea typeface="+mn-ea"/>
+                <a:cs typeface="+mn-cs"/>
+              </a:defRPr>
+            </a:lvl2pPr>
+            <a:lvl3pPr marL="914400" algn="l" defTabSz="914400" rtl="0" eaLnBrk="1" latinLnBrk="0" hangingPunct="1">
+              <a:defRPr sz="1800" kern="1200">
+                <a:solidFill>
+                  <a:schemeClr val="tx1"/>
+                </a:solidFill>
+                <a:latin typeface="+mn-lt"/>
+                <a:ea typeface="+mn-ea"/>
+                <a:cs typeface="+mn-cs"/>
+              </a:defRPr>
+            </a:lvl3pPr>
+            <a:lvl4pPr marL="1371600" algn="l" defTabSz="914400" rtl="0" eaLnBrk="1" latinLnBrk="0" hangingPunct="1">
+              <a:defRPr sz="1800" kern="1200">
+                <a:solidFill>
+                  <a:schemeClr val="tx1"/>
+                </a:solidFill>
+                <a:latin typeface="+mn-lt"/>
+                <a:ea typeface="+mn-ea"/>
+                <a:cs typeface="+mn-cs"/>
+              </a:defRPr>
+            </a:lvl4pPr>
+            <a:lvl5pPr marL="1828800" algn="l" defTabSz="914400" rtl="0" eaLnBrk="1" latinLnBrk="0" hangingPunct="1">
+              <a:defRPr sz="1800" kern="1200">
+                <a:solidFill>
+                  <a:schemeClr val="tx1"/>
+                </a:solidFill>
+                <a:latin typeface="+mn-lt"/>
+                <a:ea typeface="+mn-ea"/>
+                <a:cs typeface="+mn-cs"/>
+              </a:defRPr>
+            </a:lvl5pPr>
+            <a:lvl6pPr marL="2286000" algn="l" defTabSz="914400" rtl="0" eaLnBrk="1" latinLnBrk="0" hangingPunct="1">
+              <a:defRPr sz="1800" kern="1200">
+                <a:solidFill>
+                  <a:schemeClr val="tx1"/>
+                </a:solidFill>
+                <a:latin typeface="+mn-lt"/>
+                <a:ea typeface="+mn-ea"/>
+                <a:cs typeface="+mn-cs"/>
+              </a:defRPr>
+            </a:lvl6pPr>
+            <a:lvl7pPr marL="2743200" algn="l" defTabSz="914400" rtl="0" eaLnBrk="1" latinLnBrk="0" hangingPunct="1">
+              <a:defRPr sz="1800" kern="1200">
+                <a:solidFill>
+                  <a:schemeClr val="tx1"/>
+                </a:solidFill>
+                <a:latin typeface="+mn-lt"/>
+                <a:ea typeface="+mn-ea"/>
+                <a:cs typeface="+mn-cs"/>
+              </a:defRPr>
+            </a:lvl7pPr>
+            <a:lvl8pPr marL="3200400" algn="l" defTabSz="914400" rtl="0" eaLnBrk="1" latinLnBrk="0" hangingPunct="1">
+              <a:defRPr sz="1800" kern="1200">
+                <a:solidFill>
+                  <a:schemeClr val="tx1"/>
+                </a:solidFill>
+                <a:latin typeface="+mn-lt"/>
+                <a:ea typeface="+mn-ea"/>
+                <a:cs typeface="+mn-cs"/>
+              </a:defRPr>
+            </a:lvl8pPr>
+            <a:lvl9pPr marL="3657600" algn="l" defTabSz="914400" rtl="0" eaLnBrk="1" latinLnBrk="0" hangingPunct="1">
+              <a:defRPr sz="1800" kern="1200">
+                <a:solidFill>
+                  <a:schemeClr val="tx1"/>
+                </a:solidFill>
+                <a:latin typeface="+mn-lt"/>
+                <a:ea typeface="+mn-ea"/>
+                <a:cs typeface="+mn-cs"/>
+              </a:defRPr>
+            </a:lvl9pPr>
+          </a:lstStyle>
+          <a:p>
+            <a:pPr algn="ctr"/>
+            <a:endParaRPr lang="en-US" altLang="zh-CN" b="1" noProof="1">
+              <a:solidFill>
+                <a:schemeClr val="bg2"/>
+              </a:solidFill>
+              <a:latin typeface="+mj-lt"/>
+              <a:ea typeface="+mj-ea"/>
+            </a:endParaRPr>
+          </a:p>
+        </p:txBody>
+      </p:sp>
+      <p:sp>
+        <p:nvSpPr>
+          <p:cNvPr id="18" name="Rectangle 03">
+            <a:extLst>
+              <a:ext uri="{FF2B5EF4-FFF2-40B4-BE49-F238E27FC236}">
+                <a16:creationId xmlns:a16="http://schemas.microsoft.com/office/drawing/2014/main" id="{F379DD77-5A9A-AFFB-A8F9-07D52E7790AB}"/>
+              </a:ext>
+              <a:ext uri="{C183D7F6-B498-43B3-948B-1728B52AA6E4}">
+                <adec:decorative xmlns:adec="http://schemas.microsoft.com/office/drawing/2017/decorative" val="1"/>
+              </a:ext>
+            </a:extLst>
+          </p:cNvPr>
+          <p:cNvSpPr>
+            <a:spLocks noChangeArrowheads="1"/>
+          </p:cNvSpPr>
+          <p:nvPr userDrawn="1"/>
+        </p:nvSpPr>
+        <p:spPr bwMode="auto">
+          <a:xfrm>
+            <a:off x="986779" y="4890570"/>
+            <a:ext cx="468000" cy="468000"/>
+          </a:xfrm>
+          <a:prstGeom prst="rect">
+            <a:avLst/>
+          </a:prstGeom>
+          <a:solidFill>
+            <a:schemeClr val="tx1"/>
+          </a:solidFill>
+        </p:spPr>
+        <p:txBody>
+          <a:bodyPr wrap="square" lIns="0" tIns="0" rIns="0" bIns="0" rtlCol="0" anchor="ctr" anchorCtr="0">
+            <a:noAutofit/>
+          </a:bodyPr>
+          <a:lstStyle>
+            <a:defPPr>
+              <a:defRPr lang="en-US"/>
+            </a:defPPr>
+            <a:lvl1pPr marL="0" algn="l" defTabSz="914400" rtl="0" eaLnBrk="1" latinLnBrk="0" hangingPunct="1">
+              <a:defRPr sz="1800" kern="1200">
+                <a:solidFill>
+                  <a:schemeClr val="tx1"/>
+                </a:solidFill>
+                <a:latin typeface="+mn-lt"/>
+                <a:ea typeface="+mn-ea"/>
+                <a:cs typeface="+mn-cs"/>
+              </a:defRPr>
+            </a:lvl1pPr>
+            <a:lvl2pPr marL="457200" algn="l" defTabSz="914400" rtl="0" eaLnBrk="1" latinLnBrk="0" hangingPunct="1">
+              <a:defRPr sz="1800" kern="1200">
+                <a:solidFill>
+                  <a:schemeClr val="tx1"/>
+                </a:solidFill>
+                <a:latin typeface="+mn-lt"/>
+                <a:ea typeface="+mn-ea"/>
+                <a:cs typeface="+mn-cs"/>
+              </a:defRPr>
+            </a:lvl2pPr>
+            <a:lvl3pPr marL="914400" algn="l" defTabSz="914400" rtl="0" eaLnBrk="1" latinLnBrk="0" hangingPunct="1">
+              <a:defRPr sz="1800" kern="1200">
+                <a:solidFill>
+                  <a:schemeClr val="tx1"/>
+                </a:solidFill>
+                <a:latin typeface="+mn-lt"/>
+                <a:ea typeface="+mn-ea"/>
+                <a:cs typeface="+mn-cs"/>
+              </a:defRPr>
+            </a:lvl3pPr>
+            <a:lvl4pPr marL="1371600" algn="l" defTabSz="914400" rtl="0" eaLnBrk="1" latinLnBrk="0" hangingPunct="1">
+              <a:defRPr sz="1800" kern="1200">
+                <a:solidFill>
+                  <a:schemeClr val="tx1"/>
+                </a:solidFill>
+                <a:latin typeface="+mn-lt"/>
+                <a:ea typeface="+mn-ea"/>
+                <a:cs typeface="+mn-cs"/>
+              </a:defRPr>
+            </a:lvl4pPr>
+            <a:lvl5pPr marL="1828800" algn="l" defTabSz="914400" rtl="0" eaLnBrk="1" latinLnBrk="0" hangingPunct="1">
+              <a:defRPr sz="1800" kern="1200">
+                <a:solidFill>
+                  <a:schemeClr val="tx1"/>
+                </a:solidFill>
+                <a:latin typeface="+mn-lt"/>
+                <a:ea typeface="+mn-ea"/>
+                <a:cs typeface="+mn-cs"/>
+              </a:defRPr>
+            </a:lvl5pPr>
+            <a:lvl6pPr marL="2286000" algn="l" defTabSz="914400" rtl="0" eaLnBrk="1" latinLnBrk="0" hangingPunct="1">
+              <a:defRPr sz="1800" kern="1200">
+                <a:solidFill>
+                  <a:schemeClr val="tx1"/>
+                </a:solidFill>
+                <a:latin typeface="+mn-lt"/>
+                <a:ea typeface="+mn-ea"/>
+                <a:cs typeface="+mn-cs"/>
+              </a:defRPr>
+            </a:lvl6pPr>
+            <a:lvl7pPr marL="2743200" algn="l" defTabSz="914400" rtl="0" eaLnBrk="1" latinLnBrk="0" hangingPunct="1">
+              <a:defRPr sz="1800" kern="1200">
+                <a:solidFill>
+                  <a:schemeClr val="tx1"/>
+                </a:solidFill>
+                <a:latin typeface="+mn-lt"/>
+                <a:ea typeface="+mn-ea"/>
+                <a:cs typeface="+mn-cs"/>
+              </a:defRPr>
+            </a:lvl7pPr>
+            <a:lvl8pPr marL="3200400" algn="l" defTabSz="914400" rtl="0" eaLnBrk="1" latinLnBrk="0" hangingPunct="1">
+              <a:defRPr sz="1800" kern="1200">
+                <a:solidFill>
+                  <a:schemeClr val="tx1"/>
+                </a:solidFill>
+                <a:latin typeface="+mn-lt"/>
+                <a:ea typeface="+mn-ea"/>
+                <a:cs typeface="+mn-cs"/>
+              </a:defRPr>
+            </a:lvl8pPr>
+            <a:lvl9pPr marL="3657600" algn="l" defTabSz="914400" rtl="0" eaLnBrk="1" latinLnBrk="0" hangingPunct="1">
+              <a:defRPr sz="1800" kern="1200">
+                <a:solidFill>
+                  <a:schemeClr val="tx1"/>
+                </a:solidFill>
+                <a:latin typeface="+mn-lt"/>
+                <a:ea typeface="+mn-ea"/>
+                <a:cs typeface="+mn-cs"/>
+              </a:defRPr>
+            </a:lvl9pPr>
+          </a:lstStyle>
+          <a:p>
+            <a:pPr algn="ctr"/>
+            <a:endParaRPr lang="en-US" altLang="zh-CN" b="1" noProof="1">
+              <a:solidFill>
+                <a:schemeClr val="bg2"/>
+              </a:solidFill>
+              <a:latin typeface="+mj-lt"/>
+              <a:ea typeface="+mj-ea"/>
+            </a:endParaRPr>
+          </a:p>
+        </p:txBody>
+      </p:sp>
+      <p:sp>
+        <p:nvSpPr>
+          <p:cNvPr id="20" name="Rectangle 04">
+            <a:extLst>
+              <a:ext uri="{FF2B5EF4-FFF2-40B4-BE49-F238E27FC236}">
+                <a16:creationId xmlns:a16="http://schemas.microsoft.com/office/drawing/2014/main" id="{8D81854D-7A68-8152-BE67-C5FD9CA58AA9}"/>
+              </a:ext>
+              <a:ext uri="{C183D7F6-B498-43B3-948B-1728B52AA6E4}">
+                <adec:decorative xmlns:adec="http://schemas.microsoft.com/office/drawing/2017/decorative" val="1"/>
+              </a:ext>
+            </a:extLst>
+          </p:cNvPr>
+          <p:cNvSpPr>
+            <a:spLocks noChangeArrowheads="1"/>
+          </p:cNvSpPr>
+          <p:nvPr userDrawn="1"/>
+        </p:nvSpPr>
+        <p:spPr bwMode="auto">
+          <a:xfrm>
+            <a:off x="6307406" y="2576993"/>
+            <a:ext cx="468000" cy="468000"/>
+          </a:xfrm>
+          <a:prstGeom prst="rect">
+            <a:avLst/>
+          </a:prstGeom>
+          <a:solidFill>
+            <a:schemeClr val="tx1"/>
+          </a:solidFill>
+        </p:spPr>
+        <p:txBody>
+          <a:bodyPr wrap="square" lIns="0" tIns="0" rIns="0" bIns="0" rtlCol="0" anchor="ctr" anchorCtr="0">
+            <a:noAutofit/>
+          </a:bodyPr>
+          <a:lstStyle>
+            <a:defPPr>
+              <a:defRPr lang="en-US"/>
+            </a:defPPr>
+            <a:lvl1pPr marL="0" algn="l" defTabSz="914400" rtl="0" eaLnBrk="1" latinLnBrk="0" hangingPunct="1">
+              <a:defRPr sz="1800" kern="1200">
+                <a:solidFill>
+                  <a:schemeClr val="tx1"/>
+                </a:solidFill>
+                <a:latin typeface="+mn-lt"/>
+                <a:ea typeface="+mn-ea"/>
+                <a:cs typeface="+mn-cs"/>
+              </a:defRPr>
+            </a:lvl1pPr>
+            <a:lvl2pPr marL="457200" algn="l" defTabSz="914400" rtl="0" eaLnBrk="1" latinLnBrk="0" hangingPunct="1">
+              <a:defRPr sz="1800" kern="1200">
+                <a:solidFill>
+                  <a:schemeClr val="tx1"/>
+                </a:solidFill>
+                <a:latin typeface="+mn-lt"/>
+                <a:ea typeface="+mn-ea"/>
+                <a:cs typeface="+mn-cs"/>
+              </a:defRPr>
+            </a:lvl2pPr>
+            <a:lvl3pPr marL="914400" algn="l" defTabSz="914400" rtl="0" eaLnBrk="1" latinLnBrk="0" hangingPunct="1">
+              <a:defRPr sz="1800" kern="1200">
+                <a:solidFill>
+                  <a:schemeClr val="tx1"/>
+                </a:solidFill>
+                <a:latin typeface="+mn-lt"/>
+                <a:ea typeface="+mn-ea"/>
+                <a:cs typeface="+mn-cs"/>
+              </a:defRPr>
+            </a:lvl3pPr>
+            <a:lvl4pPr marL="1371600" algn="l" defTabSz="914400" rtl="0" eaLnBrk="1" latinLnBrk="0" hangingPunct="1">
+              <a:defRPr sz="1800" kern="1200">
+                <a:solidFill>
+                  <a:schemeClr val="tx1"/>
+                </a:solidFill>
+                <a:latin typeface="+mn-lt"/>
+                <a:ea typeface="+mn-ea"/>
+                <a:cs typeface="+mn-cs"/>
+              </a:defRPr>
+            </a:lvl4pPr>
+            <a:lvl5pPr marL="1828800" algn="l" defTabSz="914400" rtl="0" eaLnBrk="1" latinLnBrk="0" hangingPunct="1">
+              <a:defRPr sz="1800" kern="1200">
+                <a:solidFill>
+                  <a:schemeClr val="tx1"/>
+                </a:solidFill>
+                <a:latin typeface="+mn-lt"/>
+                <a:ea typeface="+mn-ea"/>
+                <a:cs typeface="+mn-cs"/>
+              </a:defRPr>
+            </a:lvl5pPr>
+            <a:lvl6pPr marL="2286000" algn="l" defTabSz="914400" rtl="0" eaLnBrk="1" latinLnBrk="0" hangingPunct="1">
+              <a:defRPr sz="1800" kern="1200">
+                <a:solidFill>
+                  <a:schemeClr val="tx1"/>
+                </a:solidFill>
+                <a:latin typeface="+mn-lt"/>
+                <a:ea typeface="+mn-ea"/>
+                <a:cs typeface="+mn-cs"/>
+              </a:defRPr>
+            </a:lvl6pPr>
+            <a:lvl7pPr marL="2743200" algn="l" defTabSz="914400" rtl="0" eaLnBrk="1" latinLnBrk="0" hangingPunct="1">
+              <a:defRPr sz="1800" kern="1200">
+                <a:solidFill>
+                  <a:schemeClr val="tx1"/>
+                </a:solidFill>
+                <a:latin typeface="+mn-lt"/>
+                <a:ea typeface="+mn-ea"/>
+                <a:cs typeface="+mn-cs"/>
+              </a:defRPr>
+            </a:lvl7pPr>
+            <a:lvl8pPr marL="3200400" algn="l" defTabSz="914400" rtl="0" eaLnBrk="1" latinLnBrk="0" hangingPunct="1">
+              <a:defRPr sz="1800" kern="1200">
+                <a:solidFill>
+                  <a:schemeClr val="tx1"/>
+                </a:solidFill>
+                <a:latin typeface="+mn-lt"/>
+                <a:ea typeface="+mn-ea"/>
+                <a:cs typeface="+mn-cs"/>
+              </a:defRPr>
+            </a:lvl8pPr>
+            <a:lvl9pPr marL="3657600" algn="l" defTabSz="914400" rtl="0" eaLnBrk="1" latinLnBrk="0" hangingPunct="1">
+              <a:defRPr sz="1800" kern="1200">
+                <a:solidFill>
+                  <a:schemeClr val="tx1"/>
+                </a:solidFill>
+                <a:latin typeface="+mn-lt"/>
+                <a:ea typeface="+mn-ea"/>
+                <a:cs typeface="+mn-cs"/>
+              </a:defRPr>
+            </a:lvl9pPr>
+          </a:lstStyle>
+          <a:p>
+            <a:pPr algn="ctr"/>
+            <a:endParaRPr lang="en-US" altLang="zh-CN" b="1" noProof="1">
+              <a:solidFill>
+                <a:schemeClr val="bg2"/>
+              </a:solidFill>
+              <a:latin typeface="+mj-lt"/>
+              <a:ea typeface="+mj-ea"/>
+            </a:endParaRPr>
+          </a:p>
+        </p:txBody>
+      </p:sp>
+      <p:sp>
+        <p:nvSpPr>
+          <p:cNvPr id="19" name="Rectangle 05">
+            <a:extLst>
+              <a:ext uri="{FF2B5EF4-FFF2-40B4-BE49-F238E27FC236}">
+                <a16:creationId xmlns:a16="http://schemas.microsoft.com/office/drawing/2014/main" id="{EA9BC805-8AC0-6973-6307-402D4873D258}"/>
+              </a:ext>
+              <a:ext uri="{C183D7F6-B498-43B3-948B-1728B52AA6E4}">
+                <adec:decorative xmlns:adec="http://schemas.microsoft.com/office/drawing/2017/decorative" val="1"/>
+              </a:ext>
+            </a:extLst>
+          </p:cNvPr>
+          <p:cNvSpPr>
+            <a:spLocks noChangeArrowheads="1"/>
+          </p:cNvSpPr>
+          <p:nvPr userDrawn="1"/>
+        </p:nvSpPr>
+        <p:spPr bwMode="auto">
+          <a:xfrm>
+            <a:off x="6307406" y="3726576"/>
+            <a:ext cx="468000" cy="468000"/>
+          </a:xfrm>
+          <a:prstGeom prst="rect">
+            <a:avLst/>
+          </a:prstGeom>
+          <a:solidFill>
+            <a:schemeClr val="tx1"/>
+          </a:solidFill>
+        </p:spPr>
+        <p:txBody>
+          <a:bodyPr wrap="square" lIns="0" tIns="0" rIns="0" bIns="0" rtlCol="0" anchor="ctr" anchorCtr="0">
+            <a:noAutofit/>
+          </a:bodyPr>
+          <a:lstStyle>
+            <a:defPPr>
+              <a:defRPr lang="en-US"/>
+            </a:defPPr>
+            <a:lvl1pPr marL="0" algn="l" defTabSz="914400" rtl="0" eaLnBrk="1" latinLnBrk="0" hangingPunct="1">
+              <a:defRPr sz="1800" kern="1200">
+                <a:solidFill>
+                  <a:schemeClr val="tx1"/>
+                </a:solidFill>
+                <a:latin typeface="+mn-lt"/>
+                <a:ea typeface="+mn-ea"/>
+                <a:cs typeface="+mn-cs"/>
+              </a:defRPr>
+            </a:lvl1pPr>
+            <a:lvl2pPr marL="457200" algn="l" defTabSz="914400" rtl="0" eaLnBrk="1" latinLnBrk="0" hangingPunct="1">
+              <a:defRPr sz="1800" kern="1200">
+                <a:solidFill>
+                  <a:schemeClr val="tx1"/>
+                </a:solidFill>
+                <a:latin typeface="+mn-lt"/>
+                <a:ea typeface="+mn-ea"/>
+                <a:cs typeface="+mn-cs"/>
+              </a:defRPr>
+            </a:lvl2pPr>
+            <a:lvl3pPr marL="914400" algn="l" defTabSz="914400" rtl="0" eaLnBrk="1" latinLnBrk="0" hangingPunct="1">
+              <a:defRPr sz="1800" kern="1200">
+                <a:solidFill>
+                  <a:schemeClr val="tx1"/>
+                </a:solidFill>
+                <a:latin typeface="+mn-lt"/>
+                <a:ea typeface="+mn-ea"/>
+                <a:cs typeface="+mn-cs"/>
+              </a:defRPr>
+            </a:lvl3pPr>
+            <a:lvl4pPr marL="1371600" algn="l" defTabSz="914400" rtl="0" eaLnBrk="1" latinLnBrk="0" hangingPunct="1">
+              <a:defRPr sz="1800" kern="1200">
+                <a:solidFill>
+                  <a:schemeClr val="tx1"/>
+                </a:solidFill>
+                <a:latin typeface="+mn-lt"/>
+                <a:ea typeface="+mn-ea"/>
+                <a:cs typeface="+mn-cs"/>
+              </a:defRPr>
+            </a:lvl4pPr>
+            <a:lvl5pPr marL="1828800" algn="l" defTabSz="914400" rtl="0" eaLnBrk="1" latinLnBrk="0" hangingPunct="1">
+              <a:defRPr sz="1800" kern="1200">
+                <a:solidFill>
+                  <a:schemeClr val="tx1"/>
+                </a:solidFill>
+                <a:latin typeface="+mn-lt"/>
+                <a:ea typeface="+mn-ea"/>
+                <a:cs typeface="+mn-cs"/>
+              </a:defRPr>
+            </a:lvl5pPr>
+            <a:lvl6pPr marL="2286000" algn="l" defTabSz="914400" rtl="0" eaLnBrk="1" latinLnBrk="0" hangingPunct="1">
+              <a:defRPr sz="1800" kern="1200">
+                <a:solidFill>
+                  <a:schemeClr val="tx1"/>
+                </a:solidFill>
+                <a:latin typeface="+mn-lt"/>
+                <a:ea typeface="+mn-ea"/>
+                <a:cs typeface="+mn-cs"/>
+              </a:defRPr>
+            </a:lvl6pPr>
+            <a:lvl7pPr marL="2743200" algn="l" defTabSz="914400" rtl="0" eaLnBrk="1" latinLnBrk="0" hangingPunct="1">
+              <a:defRPr sz="1800" kern="1200">
+                <a:solidFill>
+                  <a:schemeClr val="tx1"/>
+                </a:solidFill>
+                <a:latin typeface="+mn-lt"/>
+                <a:ea typeface="+mn-ea"/>
+                <a:cs typeface="+mn-cs"/>
+              </a:defRPr>
+            </a:lvl7pPr>
+            <a:lvl8pPr marL="3200400" algn="l" defTabSz="914400" rtl="0" eaLnBrk="1" latinLnBrk="0" hangingPunct="1">
+              <a:defRPr sz="1800" kern="1200">
+                <a:solidFill>
+                  <a:schemeClr val="tx1"/>
+                </a:solidFill>
+                <a:latin typeface="+mn-lt"/>
+                <a:ea typeface="+mn-ea"/>
+                <a:cs typeface="+mn-cs"/>
+              </a:defRPr>
+            </a:lvl8pPr>
+            <a:lvl9pPr marL="3657600" algn="l" defTabSz="914400" rtl="0" eaLnBrk="1" latinLnBrk="0" hangingPunct="1">
+              <a:defRPr sz="1800" kern="1200">
+                <a:solidFill>
+                  <a:schemeClr val="tx1"/>
+                </a:solidFill>
+                <a:latin typeface="+mn-lt"/>
+                <a:ea typeface="+mn-ea"/>
+                <a:cs typeface="+mn-cs"/>
+              </a:defRPr>
+            </a:lvl9pPr>
+          </a:lstStyle>
+          <a:p>
+            <a:pPr algn="ctr"/>
+            <a:endParaRPr lang="en-US" altLang="zh-CN" b="1" noProof="1">
+              <a:solidFill>
+                <a:schemeClr val="bg2"/>
+              </a:solidFill>
+              <a:latin typeface="+mj-lt"/>
+              <a:ea typeface="+mj-ea"/>
+            </a:endParaRPr>
+          </a:p>
+        </p:txBody>
+      </p:sp>
+      <p:sp>
+        <p:nvSpPr>
+          <p:cNvPr id="15" name="Rectangle 06">
             <a:extLst>
               <a:ext uri="{FF2B5EF4-FFF2-40B4-BE49-F238E27FC236}">
                 <a16:creationId xmlns:a16="http://schemas.microsoft.com/office/drawing/2014/main" id="{CDDF026D-1020-DA06-4A27-58414DD16698}"/>
@@ -2291,706 +3007,6 @@
       </p:sp>
       <p:sp>
         <p:nvSpPr>
-          <p:cNvPr id="16" name="Rectangle 18">
-            <a:extLst>
-              <a:ext uri="{FF2B5EF4-FFF2-40B4-BE49-F238E27FC236}">
-                <a16:creationId xmlns:a16="http://schemas.microsoft.com/office/drawing/2014/main" id="{D3B1BB6E-B06C-A17C-8C3E-79EABCBE4EF7}"/>
-              </a:ext>
-              <a:ext uri="{C183D7F6-B498-43B3-948B-1728B52AA6E4}">
-                <adec:decorative xmlns:adec="http://schemas.microsoft.com/office/drawing/2017/decorative" val="1"/>
-              </a:ext>
-            </a:extLst>
-          </p:cNvPr>
-          <p:cNvSpPr>
-            <a:spLocks noChangeArrowheads="1"/>
-          </p:cNvSpPr>
-          <p:nvPr userDrawn="1"/>
-        </p:nvSpPr>
-        <p:spPr bwMode="auto">
-          <a:xfrm>
-            <a:off x="986779" y="2576993"/>
-            <a:ext cx="468000" cy="468000"/>
-          </a:xfrm>
-          <a:prstGeom prst="rect">
-            <a:avLst/>
-          </a:prstGeom>
-          <a:solidFill>
-            <a:schemeClr val="tx1"/>
-          </a:solidFill>
-        </p:spPr>
-        <p:txBody>
-          <a:bodyPr wrap="square" lIns="0" tIns="0" rIns="0" bIns="0" rtlCol="0" anchor="ctr" anchorCtr="0">
-            <a:noAutofit/>
-          </a:bodyPr>
-          <a:lstStyle>
-            <a:defPPr>
-              <a:defRPr lang="en-US"/>
-            </a:defPPr>
-            <a:lvl1pPr marL="0" algn="l" defTabSz="914400" rtl="0" eaLnBrk="1" latinLnBrk="0" hangingPunct="1">
-              <a:defRPr sz="1800" kern="1200">
-                <a:solidFill>
-                  <a:schemeClr val="tx1"/>
-                </a:solidFill>
-                <a:latin typeface="+mn-lt"/>
-                <a:ea typeface="+mn-ea"/>
-                <a:cs typeface="+mn-cs"/>
-              </a:defRPr>
-            </a:lvl1pPr>
-            <a:lvl2pPr marL="457200" algn="l" defTabSz="914400" rtl="0" eaLnBrk="1" latinLnBrk="0" hangingPunct="1">
-              <a:defRPr sz="1800" kern="1200">
-                <a:solidFill>
-                  <a:schemeClr val="tx1"/>
-                </a:solidFill>
-                <a:latin typeface="+mn-lt"/>
-                <a:ea typeface="+mn-ea"/>
-                <a:cs typeface="+mn-cs"/>
-              </a:defRPr>
-            </a:lvl2pPr>
-            <a:lvl3pPr marL="914400" algn="l" defTabSz="914400" rtl="0" eaLnBrk="1" latinLnBrk="0" hangingPunct="1">
-              <a:defRPr sz="1800" kern="1200">
-                <a:solidFill>
-                  <a:schemeClr val="tx1"/>
-                </a:solidFill>
-                <a:latin typeface="+mn-lt"/>
-                <a:ea typeface="+mn-ea"/>
-                <a:cs typeface="+mn-cs"/>
-              </a:defRPr>
-            </a:lvl3pPr>
-            <a:lvl4pPr marL="1371600" algn="l" defTabSz="914400" rtl="0" eaLnBrk="1" latinLnBrk="0" hangingPunct="1">
-              <a:defRPr sz="1800" kern="1200">
-                <a:solidFill>
-                  <a:schemeClr val="tx1"/>
-                </a:solidFill>
-                <a:latin typeface="+mn-lt"/>
-                <a:ea typeface="+mn-ea"/>
-                <a:cs typeface="+mn-cs"/>
-              </a:defRPr>
-            </a:lvl4pPr>
-            <a:lvl5pPr marL="1828800" algn="l" defTabSz="914400" rtl="0" eaLnBrk="1" latinLnBrk="0" hangingPunct="1">
-              <a:defRPr sz="1800" kern="1200">
-                <a:solidFill>
-                  <a:schemeClr val="tx1"/>
-                </a:solidFill>
-                <a:latin typeface="+mn-lt"/>
-                <a:ea typeface="+mn-ea"/>
-                <a:cs typeface="+mn-cs"/>
-              </a:defRPr>
-            </a:lvl5pPr>
-            <a:lvl6pPr marL="2286000" algn="l" defTabSz="914400" rtl="0" eaLnBrk="1" latinLnBrk="0" hangingPunct="1">
-              <a:defRPr sz="1800" kern="1200">
-                <a:solidFill>
-                  <a:schemeClr val="tx1"/>
-                </a:solidFill>
-                <a:latin typeface="+mn-lt"/>
-                <a:ea typeface="+mn-ea"/>
-                <a:cs typeface="+mn-cs"/>
-              </a:defRPr>
-            </a:lvl6pPr>
-            <a:lvl7pPr marL="2743200" algn="l" defTabSz="914400" rtl="0" eaLnBrk="1" latinLnBrk="0" hangingPunct="1">
-              <a:defRPr sz="1800" kern="1200">
-                <a:solidFill>
-                  <a:schemeClr val="tx1"/>
-                </a:solidFill>
-                <a:latin typeface="+mn-lt"/>
-                <a:ea typeface="+mn-ea"/>
-                <a:cs typeface="+mn-cs"/>
-              </a:defRPr>
-            </a:lvl7pPr>
-            <a:lvl8pPr marL="3200400" algn="l" defTabSz="914400" rtl="0" eaLnBrk="1" latinLnBrk="0" hangingPunct="1">
-              <a:defRPr sz="1800" kern="1200">
-                <a:solidFill>
-                  <a:schemeClr val="tx1"/>
-                </a:solidFill>
-                <a:latin typeface="+mn-lt"/>
-                <a:ea typeface="+mn-ea"/>
-                <a:cs typeface="+mn-cs"/>
-              </a:defRPr>
-            </a:lvl8pPr>
-            <a:lvl9pPr marL="3657600" algn="l" defTabSz="914400" rtl="0" eaLnBrk="1" latinLnBrk="0" hangingPunct="1">
-              <a:defRPr sz="1800" kern="1200">
-                <a:solidFill>
-                  <a:schemeClr val="tx1"/>
-                </a:solidFill>
-                <a:latin typeface="+mn-lt"/>
-                <a:ea typeface="+mn-ea"/>
-                <a:cs typeface="+mn-cs"/>
-              </a:defRPr>
-            </a:lvl9pPr>
-          </a:lstStyle>
-          <a:p>
-            <a:pPr algn="ctr"/>
-            <a:endParaRPr lang="en-US" altLang="zh-CN" b="1" noProof="1">
-              <a:solidFill>
-                <a:schemeClr val="bg2"/>
-              </a:solidFill>
-              <a:latin typeface="+mj-lt"/>
-              <a:ea typeface="+mj-ea"/>
-            </a:endParaRPr>
-          </a:p>
-        </p:txBody>
-      </p:sp>
-      <p:sp>
-        <p:nvSpPr>
-          <p:cNvPr id="17" name="Rectangle 40">
-            <a:extLst>
-              <a:ext uri="{FF2B5EF4-FFF2-40B4-BE49-F238E27FC236}">
-                <a16:creationId xmlns:a16="http://schemas.microsoft.com/office/drawing/2014/main" id="{0731A7D4-E0B1-9EFC-60E9-55B28D5F0295}"/>
-              </a:ext>
-              <a:ext uri="{C183D7F6-B498-43B3-948B-1728B52AA6E4}">
-                <adec:decorative xmlns:adec="http://schemas.microsoft.com/office/drawing/2017/decorative" val="1"/>
-              </a:ext>
-            </a:extLst>
-          </p:cNvPr>
-          <p:cNvSpPr>
-            <a:spLocks noChangeArrowheads="1"/>
-          </p:cNvSpPr>
-          <p:nvPr userDrawn="1"/>
-        </p:nvSpPr>
-        <p:spPr bwMode="auto">
-          <a:xfrm>
-            <a:off x="986779" y="3726576"/>
-            <a:ext cx="468000" cy="468000"/>
-          </a:xfrm>
-          <a:prstGeom prst="rect">
-            <a:avLst/>
-          </a:prstGeom>
-          <a:solidFill>
-            <a:schemeClr val="tx1"/>
-          </a:solidFill>
-        </p:spPr>
-        <p:txBody>
-          <a:bodyPr wrap="square" lIns="0" tIns="0" rIns="0" bIns="0" rtlCol="0" anchor="ctr" anchorCtr="0">
-            <a:noAutofit/>
-          </a:bodyPr>
-          <a:lstStyle>
-            <a:defPPr>
-              <a:defRPr lang="en-US"/>
-            </a:defPPr>
-            <a:lvl1pPr marL="0" algn="l" defTabSz="914400" rtl="0" eaLnBrk="1" latinLnBrk="0" hangingPunct="1">
-              <a:defRPr sz="1800" kern="1200">
-                <a:solidFill>
-                  <a:schemeClr val="tx1"/>
-                </a:solidFill>
-                <a:latin typeface="+mn-lt"/>
-                <a:ea typeface="+mn-ea"/>
-                <a:cs typeface="+mn-cs"/>
-              </a:defRPr>
-            </a:lvl1pPr>
-            <a:lvl2pPr marL="457200" algn="l" defTabSz="914400" rtl="0" eaLnBrk="1" latinLnBrk="0" hangingPunct="1">
-              <a:defRPr sz="1800" kern="1200">
-                <a:solidFill>
-                  <a:schemeClr val="tx1"/>
-                </a:solidFill>
-                <a:latin typeface="+mn-lt"/>
-                <a:ea typeface="+mn-ea"/>
-                <a:cs typeface="+mn-cs"/>
-              </a:defRPr>
-            </a:lvl2pPr>
-            <a:lvl3pPr marL="914400" algn="l" defTabSz="914400" rtl="0" eaLnBrk="1" latinLnBrk="0" hangingPunct="1">
-              <a:defRPr sz="1800" kern="1200">
-                <a:solidFill>
-                  <a:schemeClr val="tx1"/>
-                </a:solidFill>
-                <a:latin typeface="+mn-lt"/>
-                <a:ea typeface="+mn-ea"/>
-                <a:cs typeface="+mn-cs"/>
-              </a:defRPr>
-            </a:lvl3pPr>
-            <a:lvl4pPr marL="1371600" algn="l" defTabSz="914400" rtl="0" eaLnBrk="1" latinLnBrk="0" hangingPunct="1">
-              <a:defRPr sz="1800" kern="1200">
-                <a:solidFill>
-                  <a:schemeClr val="tx1"/>
-                </a:solidFill>
-                <a:latin typeface="+mn-lt"/>
-                <a:ea typeface="+mn-ea"/>
-                <a:cs typeface="+mn-cs"/>
-              </a:defRPr>
-            </a:lvl4pPr>
-            <a:lvl5pPr marL="1828800" algn="l" defTabSz="914400" rtl="0" eaLnBrk="1" latinLnBrk="0" hangingPunct="1">
-              <a:defRPr sz="1800" kern="1200">
-                <a:solidFill>
-                  <a:schemeClr val="tx1"/>
-                </a:solidFill>
-                <a:latin typeface="+mn-lt"/>
-                <a:ea typeface="+mn-ea"/>
-                <a:cs typeface="+mn-cs"/>
-              </a:defRPr>
-            </a:lvl5pPr>
-            <a:lvl6pPr marL="2286000" algn="l" defTabSz="914400" rtl="0" eaLnBrk="1" latinLnBrk="0" hangingPunct="1">
-              <a:defRPr sz="1800" kern="1200">
-                <a:solidFill>
-                  <a:schemeClr val="tx1"/>
-                </a:solidFill>
-                <a:latin typeface="+mn-lt"/>
-                <a:ea typeface="+mn-ea"/>
-                <a:cs typeface="+mn-cs"/>
-              </a:defRPr>
-            </a:lvl6pPr>
-            <a:lvl7pPr marL="2743200" algn="l" defTabSz="914400" rtl="0" eaLnBrk="1" latinLnBrk="0" hangingPunct="1">
-              <a:defRPr sz="1800" kern="1200">
-                <a:solidFill>
-                  <a:schemeClr val="tx1"/>
-                </a:solidFill>
-                <a:latin typeface="+mn-lt"/>
-                <a:ea typeface="+mn-ea"/>
-                <a:cs typeface="+mn-cs"/>
-              </a:defRPr>
-            </a:lvl7pPr>
-            <a:lvl8pPr marL="3200400" algn="l" defTabSz="914400" rtl="0" eaLnBrk="1" latinLnBrk="0" hangingPunct="1">
-              <a:defRPr sz="1800" kern="1200">
-                <a:solidFill>
-                  <a:schemeClr val="tx1"/>
-                </a:solidFill>
-                <a:latin typeface="+mn-lt"/>
-                <a:ea typeface="+mn-ea"/>
-                <a:cs typeface="+mn-cs"/>
-              </a:defRPr>
-            </a:lvl8pPr>
-            <a:lvl9pPr marL="3657600" algn="l" defTabSz="914400" rtl="0" eaLnBrk="1" latinLnBrk="0" hangingPunct="1">
-              <a:defRPr sz="1800" kern="1200">
-                <a:solidFill>
-                  <a:schemeClr val="tx1"/>
-                </a:solidFill>
-                <a:latin typeface="+mn-lt"/>
-                <a:ea typeface="+mn-ea"/>
-                <a:cs typeface="+mn-cs"/>
-              </a:defRPr>
-            </a:lvl9pPr>
-          </a:lstStyle>
-          <a:p>
-            <a:pPr algn="ctr"/>
-            <a:endParaRPr lang="en-US" altLang="zh-CN" b="1" noProof="1">
-              <a:solidFill>
-                <a:schemeClr val="bg2"/>
-              </a:solidFill>
-              <a:latin typeface="+mj-lt"/>
-              <a:ea typeface="+mj-ea"/>
-            </a:endParaRPr>
-          </a:p>
-        </p:txBody>
-      </p:sp>
-      <p:sp>
-        <p:nvSpPr>
-          <p:cNvPr id="18" name="Rectangle 48">
-            <a:extLst>
-              <a:ext uri="{FF2B5EF4-FFF2-40B4-BE49-F238E27FC236}">
-                <a16:creationId xmlns:a16="http://schemas.microsoft.com/office/drawing/2014/main" id="{F379DD77-5A9A-AFFB-A8F9-07D52E7790AB}"/>
-              </a:ext>
-              <a:ext uri="{C183D7F6-B498-43B3-948B-1728B52AA6E4}">
-                <adec:decorative xmlns:adec="http://schemas.microsoft.com/office/drawing/2017/decorative" val="1"/>
-              </a:ext>
-            </a:extLst>
-          </p:cNvPr>
-          <p:cNvSpPr>
-            <a:spLocks noChangeArrowheads="1"/>
-          </p:cNvSpPr>
-          <p:nvPr userDrawn="1"/>
-        </p:nvSpPr>
-        <p:spPr bwMode="auto">
-          <a:xfrm>
-            <a:off x="986779" y="4890570"/>
-            <a:ext cx="468000" cy="468000"/>
-          </a:xfrm>
-          <a:prstGeom prst="rect">
-            <a:avLst/>
-          </a:prstGeom>
-          <a:solidFill>
-            <a:schemeClr val="tx1"/>
-          </a:solidFill>
-        </p:spPr>
-        <p:txBody>
-          <a:bodyPr wrap="square" lIns="0" tIns="0" rIns="0" bIns="0" rtlCol="0" anchor="ctr" anchorCtr="0">
-            <a:noAutofit/>
-          </a:bodyPr>
-          <a:lstStyle>
-            <a:defPPr>
-              <a:defRPr lang="en-US"/>
-            </a:defPPr>
-            <a:lvl1pPr marL="0" algn="l" defTabSz="914400" rtl="0" eaLnBrk="1" latinLnBrk="0" hangingPunct="1">
-              <a:defRPr sz="1800" kern="1200">
-                <a:solidFill>
-                  <a:schemeClr val="tx1"/>
-                </a:solidFill>
-                <a:latin typeface="+mn-lt"/>
-                <a:ea typeface="+mn-ea"/>
-                <a:cs typeface="+mn-cs"/>
-              </a:defRPr>
-            </a:lvl1pPr>
-            <a:lvl2pPr marL="457200" algn="l" defTabSz="914400" rtl="0" eaLnBrk="1" latinLnBrk="0" hangingPunct="1">
-              <a:defRPr sz="1800" kern="1200">
-                <a:solidFill>
-                  <a:schemeClr val="tx1"/>
-                </a:solidFill>
-                <a:latin typeface="+mn-lt"/>
-                <a:ea typeface="+mn-ea"/>
-                <a:cs typeface="+mn-cs"/>
-              </a:defRPr>
-            </a:lvl2pPr>
-            <a:lvl3pPr marL="914400" algn="l" defTabSz="914400" rtl="0" eaLnBrk="1" latinLnBrk="0" hangingPunct="1">
-              <a:defRPr sz="1800" kern="1200">
-                <a:solidFill>
-                  <a:schemeClr val="tx1"/>
-                </a:solidFill>
-                <a:latin typeface="+mn-lt"/>
-                <a:ea typeface="+mn-ea"/>
-                <a:cs typeface="+mn-cs"/>
-              </a:defRPr>
-            </a:lvl3pPr>
-            <a:lvl4pPr marL="1371600" algn="l" defTabSz="914400" rtl="0" eaLnBrk="1" latinLnBrk="0" hangingPunct="1">
-              <a:defRPr sz="1800" kern="1200">
-                <a:solidFill>
-                  <a:schemeClr val="tx1"/>
-                </a:solidFill>
-                <a:latin typeface="+mn-lt"/>
-                <a:ea typeface="+mn-ea"/>
-                <a:cs typeface="+mn-cs"/>
-              </a:defRPr>
-            </a:lvl4pPr>
-            <a:lvl5pPr marL="1828800" algn="l" defTabSz="914400" rtl="0" eaLnBrk="1" latinLnBrk="0" hangingPunct="1">
-              <a:defRPr sz="1800" kern="1200">
-                <a:solidFill>
-                  <a:schemeClr val="tx1"/>
-                </a:solidFill>
-                <a:latin typeface="+mn-lt"/>
-                <a:ea typeface="+mn-ea"/>
-                <a:cs typeface="+mn-cs"/>
-              </a:defRPr>
-            </a:lvl5pPr>
-            <a:lvl6pPr marL="2286000" algn="l" defTabSz="914400" rtl="0" eaLnBrk="1" latinLnBrk="0" hangingPunct="1">
-              <a:defRPr sz="1800" kern="1200">
-                <a:solidFill>
-                  <a:schemeClr val="tx1"/>
-                </a:solidFill>
-                <a:latin typeface="+mn-lt"/>
-                <a:ea typeface="+mn-ea"/>
-                <a:cs typeface="+mn-cs"/>
-              </a:defRPr>
-            </a:lvl6pPr>
-            <a:lvl7pPr marL="2743200" algn="l" defTabSz="914400" rtl="0" eaLnBrk="1" latinLnBrk="0" hangingPunct="1">
-              <a:defRPr sz="1800" kern="1200">
-                <a:solidFill>
-                  <a:schemeClr val="tx1"/>
-                </a:solidFill>
-                <a:latin typeface="+mn-lt"/>
-                <a:ea typeface="+mn-ea"/>
-                <a:cs typeface="+mn-cs"/>
-              </a:defRPr>
-            </a:lvl7pPr>
-            <a:lvl8pPr marL="3200400" algn="l" defTabSz="914400" rtl="0" eaLnBrk="1" latinLnBrk="0" hangingPunct="1">
-              <a:defRPr sz="1800" kern="1200">
-                <a:solidFill>
-                  <a:schemeClr val="tx1"/>
-                </a:solidFill>
-                <a:latin typeface="+mn-lt"/>
-                <a:ea typeface="+mn-ea"/>
-                <a:cs typeface="+mn-cs"/>
-              </a:defRPr>
-            </a:lvl8pPr>
-            <a:lvl9pPr marL="3657600" algn="l" defTabSz="914400" rtl="0" eaLnBrk="1" latinLnBrk="0" hangingPunct="1">
-              <a:defRPr sz="1800" kern="1200">
-                <a:solidFill>
-                  <a:schemeClr val="tx1"/>
-                </a:solidFill>
-                <a:latin typeface="+mn-lt"/>
-                <a:ea typeface="+mn-ea"/>
-                <a:cs typeface="+mn-cs"/>
-              </a:defRPr>
-            </a:lvl9pPr>
-          </a:lstStyle>
-          <a:p>
-            <a:pPr algn="ctr"/>
-            <a:endParaRPr lang="en-US" altLang="zh-CN" b="1" noProof="1">
-              <a:solidFill>
-                <a:schemeClr val="bg2"/>
-              </a:solidFill>
-              <a:latin typeface="+mj-lt"/>
-              <a:ea typeface="+mj-ea"/>
-            </a:endParaRPr>
-          </a:p>
-        </p:txBody>
-      </p:sp>
-      <p:sp>
-        <p:nvSpPr>
-          <p:cNvPr id="20" name="Rectangle 89">
-            <a:extLst>
-              <a:ext uri="{FF2B5EF4-FFF2-40B4-BE49-F238E27FC236}">
-                <a16:creationId xmlns:a16="http://schemas.microsoft.com/office/drawing/2014/main" id="{8D81854D-7A68-8152-BE67-C5FD9CA58AA9}"/>
-              </a:ext>
-              <a:ext uri="{C183D7F6-B498-43B3-948B-1728B52AA6E4}">
-                <adec:decorative xmlns:adec="http://schemas.microsoft.com/office/drawing/2017/decorative" val="1"/>
-              </a:ext>
-            </a:extLst>
-          </p:cNvPr>
-          <p:cNvSpPr>
-            <a:spLocks noChangeArrowheads="1"/>
-          </p:cNvSpPr>
-          <p:nvPr userDrawn="1"/>
-        </p:nvSpPr>
-        <p:spPr bwMode="auto">
-          <a:xfrm>
-            <a:off x="6307406" y="2576993"/>
-            <a:ext cx="468000" cy="468000"/>
-          </a:xfrm>
-          <a:prstGeom prst="rect">
-            <a:avLst/>
-          </a:prstGeom>
-          <a:solidFill>
-            <a:schemeClr val="tx1"/>
-          </a:solidFill>
-        </p:spPr>
-        <p:txBody>
-          <a:bodyPr wrap="square" lIns="0" tIns="0" rIns="0" bIns="0" rtlCol="0" anchor="ctr" anchorCtr="0">
-            <a:noAutofit/>
-          </a:bodyPr>
-          <a:lstStyle>
-            <a:defPPr>
-              <a:defRPr lang="en-US"/>
-            </a:defPPr>
-            <a:lvl1pPr marL="0" algn="l" defTabSz="914400" rtl="0" eaLnBrk="1" latinLnBrk="0" hangingPunct="1">
-              <a:defRPr sz="1800" kern="1200">
-                <a:solidFill>
-                  <a:schemeClr val="tx1"/>
-                </a:solidFill>
-                <a:latin typeface="+mn-lt"/>
-                <a:ea typeface="+mn-ea"/>
-                <a:cs typeface="+mn-cs"/>
-              </a:defRPr>
-            </a:lvl1pPr>
-            <a:lvl2pPr marL="457200" algn="l" defTabSz="914400" rtl="0" eaLnBrk="1" latinLnBrk="0" hangingPunct="1">
-              <a:defRPr sz="1800" kern="1200">
-                <a:solidFill>
-                  <a:schemeClr val="tx1"/>
-                </a:solidFill>
-                <a:latin typeface="+mn-lt"/>
-                <a:ea typeface="+mn-ea"/>
-                <a:cs typeface="+mn-cs"/>
-              </a:defRPr>
-            </a:lvl2pPr>
-            <a:lvl3pPr marL="914400" algn="l" defTabSz="914400" rtl="0" eaLnBrk="1" latinLnBrk="0" hangingPunct="1">
-              <a:defRPr sz="1800" kern="1200">
-                <a:solidFill>
-                  <a:schemeClr val="tx1"/>
-                </a:solidFill>
-                <a:latin typeface="+mn-lt"/>
-                <a:ea typeface="+mn-ea"/>
-                <a:cs typeface="+mn-cs"/>
-              </a:defRPr>
-            </a:lvl3pPr>
-            <a:lvl4pPr marL="1371600" algn="l" defTabSz="914400" rtl="0" eaLnBrk="1" latinLnBrk="0" hangingPunct="1">
-              <a:defRPr sz="1800" kern="1200">
-                <a:solidFill>
-                  <a:schemeClr val="tx1"/>
-                </a:solidFill>
-                <a:latin typeface="+mn-lt"/>
-                <a:ea typeface="+mn-ea"/>
-                <a:cs typeface="+mn-cs"/>
-              </a:defRPr>
-            </a:lvl4pPr>
-            <a:lvl5pPr marL="1828800" algn="l" defTabSz="914400" rtl="0" eaLnBrk="1" latinLnBrk="0" hangingPunct="1">
-              <a:defRPr sz="1800" kern="1200">
-                <a:solidFill>
-                  <a:schemeClr val="tx1"/>
-                </a:solidFill>
-                <a:latin typeface="+mn-lt"/>
-                <a:ea typeface="+mn-ea"/>
-                <a:cs typeface="+mn-cs"/>
-              </a:defRPr>
-            </a:lvl5pPr>
-            <a:lvl6pPr marL="2286000" algn="l" defTabSz="914400" rtl="0" eaLnBrk="1" latinLnBrk="0" hangingPunct="1">
-              <a:defRPr sz="1800" kern="1200">
-                <a:solidFill>
-                  <a:schemeClr val="tx1"/>
-                </a:solidFill>
-                <a:latin typeface="+mn-lt"/>
-                <a:ea typeface="+mn-ea"/>
-                <a:cs typeface="+mn-cs"/>
-              </a:defRPr>
-            </a:lvl6pPr>
-            <a:lvl7pPr marL="2743200" algn="l" defTabSz="914400" rtl="0" eaLnBrk="1" latinLnBrk="0" hangingPunct="1">
-              <a:defRPr sz="1800" kern="1200">
-                <a:solidFill>
-                  <a:schemeClr val="tx1"/>
-                </a:solidFill>
-                <a:latin typeface="+mn-lt"/>
-                <a:ea typeface="+mn-ea"/>
-                <a:cs typeface="+mn-cs"/>
-              </a:defRPr>
-            </a:lvl7pPr>
-            <a:lvl8pPr marL="3200400" algn="l" defTabSz="914400" rtl="0" eaLnBrk="1" latinLnBrk="0" hangingPunct="1">
-              <a:defRPr sz="1800" kern="1200">
-                <a:solidFill>
-                  <a:schemeClr val="tx1"/>
-                </a:solidFill>
-                <a:latin typeface="+mn-lt"/>
-                <a:ea typeface="+mn-ea"/>
-                <a:cs typeface="+mn-cs"/>
-              </a:defRPr>
-            </a:lvl8pPr>
-            <a:lvl9pPr marL="3657600" algn="l" defTabSz="914400" rtl="0" eaLnBrk="1" latinLnBrk="0" hangingPunct="1">
-              <a:defRPr sz="1800" kern="1200">
-                <a:solidFill>
-                  <a:schemeClr val="tx1"/>
-                </a:solidFill>
-                <a:latin typeface="+mn-lt"/>
-                <a:ea typeface="+mn-ea"/>
-                <a:cs typeface="+mn-cs"/>
-              </a:defRPr>
-            </a:lvl9pPr>
-          </a:lstStyle>
-          <a:p>
-            <a:pPr algn="ctr"/>
-            <a:endParaRPr lang="en-US" altLang="zh-CN" b="1" noProof="1">
-              <a:solidFill>
-                <a:schemeClr val="bg2"/>
-              </a:solidFill>
-              <a:latin typeface="+mj-lt"/>
-              <a:ea typeface="+mj-ea"/>
-            </a:endParaRPr>
-          </a:p>
-        </p:txBody>
-      </p:sp>
-      <p:sp>
-        <p:nvSpPr>
-          <p:cNvPr id="19" name="Rectangle 81">
-            <a:extLst>
-              <a:ext uri="{FF2B5EF4-FFF2-40B4-BE49-F238E27FC236}">
-                <a16:creationId xmlns:a16="http://schemas.microsoft.com/office/drawing/2014/main" id="{EA9BC805-8AC0-6973-6307-402D4873D258}"/>
-              </a:ext>
-              <a:ext uri="{C183D7F6-B498-43B3-948B-1728B52AA6E4}">
-                <adec:decorative xmlns:adec="http://schemas.microsoft.com/office/drawing/2017/decorative" val="1"/>
-              </a:ext>
-            </a:extLst>
-          </p:cNvPr>
-          <p:cNvSpPr>
-            <a:spLocks noChangeArrowheads="1"/>
-          </p:cNvSpPr>
-          <p:nvPr userDrawn="1"/>
-        </p:nvSpPr>
-        <p:spPr bwMode="auto">
-          <a:xfrm>
-            <a:off x="6307406" y="3726576"/>
-            <a:ext cx="468000" cy="468000"/>
-          </a:xfrm>
-          <a:prstGeom prst="rect">
-            <a:avLst/>
-          </a:prstGeom>
-          <a:solidFill>
-            <a:schemeClr val="tx1"/>
-          </a:solidFill>
-        </p:spPr>
-        <p:txBody>
-          <a:bodyPr wrap="square" lIns="0" tIns="0" rIns="0" bIns="0" rtlCol="0" anchor="ctr" anchorCtr="0">
-            <a:noAutofit/>
-          </a:bodyPr>
-          <a:lstStyle>
-            <a:defPPr>
-              <a:defRPr lang="en-US"/>
-            </a:defPPr>
-            <a:lvl1pPr marL="0" algn="l" defTabSz="914400" rtl="0" eaLnBrk="1" latinLnBrk="0" hangingPunct="1">
-              <a:defRPr sz="1800" kern="1200">
-                <a:solidFill>
-                  <a:schemeClr val="tx1"/>
-                </a:solidFill>
-                <a:latin typeface="+mn-lt"/>
-                <a:ea typeface="+mn-ea"/>
-                <a:cs typeface="+mn-cs"/>
-              </a:defRPr>
-            </a:lvl1pPr>
-            <a:lvl2pPr marL="457200" algn="l" defTabSz="914400" rtl="0" eaLnBrk="1" latinLnBrk="0" hangingPunct="1">
-              <a:defRPr sz="1800" kern="1200">
-                <a:solidFill>
-                  <a:schemeClr val="tx1"/>
-                </a:solidFill>
-                <a:latin typeface="+mn-lt"/>
-                <a:ea typeface="+mn-ea"/>
-                <a:cs typeface="+mn-cs"/>
-              </a:defRPr>
-            </a:lvl2pPr>
-            <a:lvl3pPr marL="914400" algn="l" defTabSz="914400" rtl="0" eaLnBrk="1" latinLnBrk="0" hangingPunct="1">
-              <a:defRPr sz="1800" kern="1200">
-                <a:solidFill>
-                  <a:schemeClr val="tx1"/>
-                </a:solidFill>
-                <a:latin typeface="+mn-lt"/>
-                <a:ea typeface="+mn-ea"/>
-                <a:cs typeface="+mn-cs"/>
-              </a:defRPr>
-            </a:lvl3pPr>
-            <a:lvl4pPr marL="1371600" algn="l" defTabSz="914400" rtl="0" eaLnBrk="1" latinLnBrk="0" hangingPunct="1">
-              <a:defRPr sz="1800" kern="1200">
-                <a:solidFill>
-                  <a:schemeClr val="tx1"/>
-                </a:solidFill>
-                <a:latin typeface="+mn-lt"/>
-                <a:ea typeface="+mn-ea"/>
-                <a:cs typeface="+mn-cs"/>
-              </a:defRPr>
-            </a:lvl4pPr>
-            <a:lvl5pPr marL="1828800" algn="l" defTabSz="914400" rtl="0" eaLnBrk="1" latinLnBrk="0" hangingPunct="1">
-              <a:defRPr sz="1800" kern="1200">
-                <a:solidFill>
-                  <a:schemeClr val="tx1"/>
-                </a:solidFill>
-                <a:latin typeface="+mn-lt"/>
-                <a:ea typeface="+mn-ea"/>
-                <a:cs typeface="+mn-cs"/>
-              </a:defRPr>
-            </a:lvl5pPr>
-            <a:lvl6pPr marL="2286000" algn="l" defTabSz="914400" rtl="0" eaLnBrk="1" latinLnBrk="0" hangingPunct="1">
-              <a:defRPr sz="1800" kern="1200">
-                <a:solidFill>
-                  <a:schemeClr val="tx1"/>
-                </a:solidFill>
-                <a:latin typeface="+mn-lt"/>
-                <a:ea typeface="+mn-ea"/>
-                <a:cs typeface="+mn-cs"/>
-              </a:defRPr>
-            </a:lvl6pPr>
-            <a:lvl7pPr marL="2743200" algn="l" defTabSz="914400" rtl="0" eaLnBrk="1" latinLnBrk="0" hangingPunct="1">
-              <a:defRPr sz="1800" kern="1200">
-                <a:solidFill>
-                  <a:schemeClr val="tx1"/>
-                </a:solidFill>
-                <a:latin typeface="+mn-lt"/>
-                <a:ea typeface="+mn-ea"/>
-                <a:cs typeface="+mn-cs"/>
-              </a:defRPr>
-            </a:lvl7pPr>
-            <a:lvl8pPr marL="3200400" algn="l" defTabSz="914400" rtl="0" eaLnBrk="1" latinLnBrk="0" hangingPunct="1">
-              <a:defRPr sz="1800" kern="1200">
-                <a:solidFill>
-                  <a:schemeClr val="tx1"/>
-                </a:solidFill>
-                <a:latin typeface="+mn-lt"/>
-                <a:ea typeface="+mn-ea"/>
-                <a:cs typeface="+mn-cs"/>
-              </a:defRPr>
-            </a:lvl8pPr>
-            <a:lvl9pPr marL="3657600" algn="l" defTabSz="914400" rtl="0" eaLnBrk="1" latinLnBrk="0" hangingPunct="1">
-              <a:defRPr sz="1800" kern="1200">
-                <a:solidFill>
-                  <a:schemeClr val="tx1"/>
-                </a:solidFill>
-                <a:latin typeface="+mn-lt"/>
-                <a:ea typeface="+mn-ea"/>
-                <a:cs typeface="+mn-cs"/>
-              </a:defRPr>
-            </a:lvl9pPr>
-          </a:lstStyle>
-          <a:p>
-            <a:pPr algn="ctr"/>
-            <a:endParaRPr lang="en-US" altLang="zh-CN" b="1" noProof="1">
-              <a:solidFill>
-                <a:schemeClr val="bg2"/>
-              </a:solidFill>
-              <a:latin typeface="+mj-lt"/>
-              <a:ea typeface="+mj-ea"/>
-            </a:endParaRPr>
-          </a:p>
-        </p:txBody>
-      </p:sp>
-      <p:sp>
-        <p:nvSpPr>
           <p:cNvPr id="2" name="Title 1">
             <a:extLst>
               <a:ext uri="{FF2B5EF4-FFF2-40B4-BE49-F238E27FC236}">
@@ -3034,7 +3050,7 @@
       </p:sp>
       <p:sp>
         <p:nvSpPr>
-          <p:cNvPr id="4" name="Text Placeholder 3">
+          <p:cNvPr id="4" name="Text Placeholder Number 01">
             <a:extLst>
               <a:ext uri="{FF2B5EF4-FFF2-40B4-BE49-F238E27FC236}">
                 <a16:creationId xmlns:a16="http://schemas.microsoft.com/office/drawing/2014/main" id="{7922A121-F74E-1DBB-F90E-9ECA5D27387F}"/>
@@ -3098,7 +3114,7 @@
       </p:sp>
       <p:sp>
         <p:nvSpPr>
-          <p:cNvPr id="9" name="Text Placeholder 7">
+          <p:cNvPr id="9" name="Text Placeholder Content 1">
             <a:extLst>
               <a:ext uri="{FF2B5EF4-FFF2-40B4-BE49-F238E27FC236}">
                 <a16:creationId xmlns:a16="http://schemas.microsoft.com/office/drawing/2014/main" id="{41A28972-BB4A-9DE5-EC1C-17EC2CEC12C1}"/>
@@ -3167,7 +3183,7 @@
       </p:sp>
       <p:sp>
         <p:nvSpPr>
-          <p:cNvPr id="5" name="Text Placeholder 3">
+          <p:cNvPr id="5" name="Text Placeholder Number 02">
             <a:extLst>
               <a:ext uri="{FF2B5EF4-FFF2-40B4-BE49-F238E27FC236}">
                 <a16:creationId xmlns:a16="http://schemas.microsoft.com/office/drawing/2014/main" id="{A1934284-00BE-576C-F2BA-050CD34490BA}"/>
@@ -3231,7 +3247,7 @@
       </p:sp>
       <p:sp>
         <p:nvSpPr>
-          <p:cNvPr id="22" name="Text Placeholder 7">
+          <p:cNvPr id="22" name="Text Placeholder Content 2">
             <a:extLst>
               <a:ext uri="{FF2B5EF4-FFF2-40B4-BE49-F238E27FC236}">
                 <a16:creationId xmlns:a16="http://schemas.microsoft.com/office/drawing/2014/main" id="{2D4614F8-0641-9496-CFCF-28C79812257F}"/>
@@ -3308,7 +3324,7 @@
       </p:sp>
       <p:sp>
         <p:nvSpPr>
-          <p:cNvPr id="11" name="Text Placeholder 3">
+          <p:cNvPr id="11" name="Text Placeholder Number 03">
             <a:extLst>
               <a:ext uri="{FF2B5EF4-FFF2-40B4-BE49-F238E27FC236}">
                 <a16:creationId xmlns:a16="http://schemas.microsoft.com/office/drawing/2014/main" id="{104425C6-1E3A-2D07-F971-EA5DD926CB83}"/>
@@ -3372,7 +3388,7 @@
       </p:sp>
       <p:sp>
         <p:nvSpPr>
-          <p:cNvPr id="24" name="Text Placeholder 7">
+          <p:cNvPr id="24" name="Text Placeholder Content 3">
             <a:extLst>
               <a:ext uri="{FF2B5EF4-FFF2-40B4-BE49-F238E27FC236}">
                 <a16:creationId xmlns:a16="http://schemas.microsoft.com/office/drawing/2014/main" id="{F10C586E-C370-0572-962A-51D7AD99CB16}"/>
@@ -3449,7 +3465,7 @@
       </p:sp>
       <p:sp>
         <p:nvSpPr>
-          <p:cNvPr id="12" name="Text Placeholder 3">
+          <p:cNvPr id="12" name="Text Placeholder Number 04">
             <a:extLst>
               <a:ext uri="{FF2B5EF4-FFF2-40B4-BE49-F238E27FC236}">
                 <a16:creationId xmlns:a16="http://schemas.microsoft.com/office/drawing/2014/main" id="{676BF66F-CB64-BBEF-FBC9-3B4A250FF543}"/>
@@ -3513,7 +3529,7 @@
       </p:sp>
       <p:sp>
         <p:nvSpPr>
-          <p:cNvPr id="10" name="Text Placeholder 7">
+          <p:cNvPr id="10" name="Text Placeholder Content 4">
             <a:extLst>
               <a:ext uri="{FF2B5EF4-FFF2-40B4-BE49-F238E27FC236}">
                 <a16:creationId xmlns:a16="http://schemas.microsoft.com/office/drawing/2014/main" id="{C15F872C-5958-E6E3-B049-C7D76BD6022C}"/>
@@ -3590,7 +3606,7 @@
       </p:sp>
       <p:sp>
         <p:nvSpPr>
-          <p:cNvPr id="13" name="Text Placeholder 3">
+          <p:cNvPr id="13" name="Text Placeholder Number 05">
             <a:extLst>
               <a:ext uri="{FF2B5EF4-FFF2-40B4-BE49-F238E27FC236}">
                 <a16:creationId xmlns:a16="http://schemas.microsoft.com/office/drawing/2014/main" id="{09563155-4732-CF95-38F9-9E62545CF208}"/>
@@ -3654,7 +3670,7 @@
       </p:sp>
       <p:sp>
         <p:nvSpPr>
-          <p:cNvPr id="23" name="Text Placeholder 7">
+          <p:cNvPr id="23" name="Text Placeholder Content 5">
             <a:extLst>
               <a:ext uri="{FF2B5EF4-FFF2-40B4-BE49-F238E27FC236}">
                 <a16:creationId xmlns:a16="http://schemas.microsoft.com/office/drawing/2014/main" id="{48632D52-9F72-E6F7-9843-8646F95B5FA3}"/>
@@ -3731,7 +3747,7 @@
       </p:sp>
       <p:sp>
         <p:nvSpPr>
-          <p:cNvPr id="3" name="Text Placeholder 3">
+          <p:cNvPr id="3" name="Text Placeholder Number 06">
             <a:extLst>
               <a:ext uri="{FF2B5EF4-FFF2-40B4-BE49-F238E27FC236}">
                 <a16:creationId xmlns:a16="http://schemas.microsoft.com/office/drawing/2014/main" id="{346343EE-8A7A-4634-E149-70C93B1BBD96}"/>
@@ -3795,7 +3811,7 @@
       </p:sp>
       <p:sp>
         <p:nvSpPr>
-          <p:cNvPr id="14" name="Text Placeholder 7">
+          <p:cNvPr id="14" name="Text Placeholder Content 6">
             <a:extLst>
               <a:ext uri="{FF2B5EF4-FFF2-40B4-BE49-F238E27FC236}">
                 <a16:creationId xmlns:a16="http://schemas.microsoft.com/office/drawing/2014/main" id="{E70FC2D7-E550-F15F-22CE-FCD2FD90E5B0}"/>
@@ -4041,7 +4057,7 @@
       </p:sp>
       <p:sp>
         <p:nvSpPr>
-          <p:cNvPr id="18" name="Rectangle 18">
+          <p:cNvPr id="18" name="Rectangle 1">
             <a:extLst>
               <a:ext uri="{FF2B5EF4-FFF2-40B4-BE49-F238E27FC236}">
                 <a16:creationId xmlns:a16="http://schemas.microsoft.com/office/drawing/2014/main" id="{8208A5D7-2403-1350-DEF6-007D02B92870}"/>
@@ -4181,7 +4197,7 @@
       </p:sp>
       <p:sp>
         <p:nvSpPr>
-          <p:cNvPr id="7" name="Text Placeholder 6">
+          <p:cNvPr id="7" name="Text Placeholder Number 01">
             <a:extLst>
               <a:ext uri="{FF2B5EF4-FFF2-40B4-BE49-F238E27FC236}">
                 <a16:creationId xmlns:a16="http://schemas.microsoft.com/office/drawing/2014/main" id="{1CA25D2A-079E-516D-CCAD-9201655031B8}"/>
@@ -4229,7 +4245,7 @@
       </p:sp>
       <p:sp>
         <p:nvSpPr>
-          <p:cNvPr id="39" name="Text Placeholder 10">
+          <p:cNvPr id="39" name="Text Placeholder Title 1">
             <a:extLst>
               <a:ext uri="{FF2B5EF4-FFF2-40B4-BE49-F238E27FC236}">
                 <a16:creationId xmlns:a16="http://schemas.microsoft.com/office/drawing/2014/main" id="{BC32326B-44AF-69A5-8950-3E83EB14E481}"/>
@@ -4313,7 +4329,7 @@
               <a:defRPr/>
             </a:pPr>
             <a:r>
-              <a:rPr lang="en-GB" altLang="zh-CN"/>
+              <a:rPr lang="en-GB" altLang="zh-CN" dirty="0"/>
               <a:t>Click to edit Master text styles</a:t>
             </a:r>
           </a:p>
@@ -4321,7 +4337,7 @@
       </p:sp>
       <p:sp>
         <p:nvSpPr>
-          <p:cNvPr id="38" name="Text Placeholder 10">
+          <p:cNvPr id="38" name="Text Placeholder Content 1">
             <a:extLst>
               <a:ext uri="{FF2B5EF4-FFF2-40B4-BE49-F238E27FC236}">
                 <a16:creationId xmlns:a16="http://schemas.microsoft.com/office/drawing/2014/main" id="{CCC11960-F75C-F63F-D4E4-8C19C5B89901}"/>
@@ -4420,7 +4436,7 @@
               <a:defRPr/>
             </a:pPr>
             <a:r>
-              <a:rPr lang="en-US" altLang="zh-CN"/>
+              <a:rPr lang="en-US" altLang="zh-CN" dirty="0"/>
               <a:t>Click to edit Master text styles</a:t>
             </a:r>
           </a:p>
@@ -4428,7 +4444,7 @@
       </p:sp>
       <p:sp>
         <p:nvSpPr>
-          <p:cNvPr id="19" name="Rectangle 40">
+          <p:cNvPr id="19" name="Rectangle 2">
             <a:extLst>
               <a:ext uri="{FF2B5EF4-FFF2-40B4-BE49-F238E27FC236}">
                 <a16:creationId xmlns:a16="http://schemas.microsoft.com/office/drawing/2014/main" id="{FF347C45-9CAA-BA8B-3731-BEB81073E148}"/>
@@ -4568,7 +4584,7 @@
       </p:sp>
       <p:sp>
         <p:nvSpPr>
-          <p:cNvPr id="8" name="Text Placeholder 6">
+          <p:cNvPr id="8" name="Text Placeholder Number 02">
             <a:extLst>
               <a:ext uri="{FF2B5EF4-FFF2-40B4-BE49-F238E27FC236}">
                 <a16:creationId xmlns:a16="http://schemas.microsoft.com/office/drawing/2014/main" id="{6CDFDE77-EF7F-9B62-D5CB-295BB8C3EBBD}"/>
@@ -4616,7 +4632,7 @@
       </p:sp>
       <p:sp>
         <p:nvSpPr>
-          <p:cNvPr id="44" name="Text Placeholder 10">
+          <p:cNvPr id="44" name="Text Placeholder Title 2">
             <a:extLst>
               <a:ext uri="{FF2B5EF4-FFF2-40B4-BE49-F238E27FC236}">
                 <a16:creationId xmlns:a16="http://schemas.microsoft.com/office/drawing/2014/main" id="{0290AD35-CF09-6504-D01E-4C05D706F1C1}"/>
@@ -4708,7 +4724,7 @@
       </p:sp>
       <p:sp>
         <p:nvSpPr>
-          <p:cNvPr id="43" name="Text Placeholder 10">
+          <p:cNvPr id="43" name="Text Placeholder Content 2">
             <a:extLst>
               <a:ext uri="{FF2B5EF4-FFF2-40B4-BE49-F238E27FC236}">
                 <a16:creationId xmlns:a16="http://schemas.microsoft.com/office/drawing/2014/main" id="{05368349-BD70-533F-1B19-8FD3F67FB75C}"/>
@@ -4815,7 +4831,7 @@
       </p:sp>
       <p:sp>
         <p:nvSpPr>
-          <p:cNvPr id="20" name="Rectangle 48">
+          <p:cNvPr id="20" name="Rectangle 3">
             <a:extLst>
               <a:ext uri="{FF2B5EF4-FFF2-40B4-BE49-F238E27FC236}">
                 <a16:creationId xmlns:a16="http://schemas.microsoft.com/office/drawing/2014/main" id="{CAC0BE5A-3FD4-01C0-EFCD-142421774C08}"/>
@@ -4955,7 +4971,7 @@
       </p:sp>
       <p:sp>
         <p:nvSpPr>
-          <p:cNvPr id="9" name="Text Placeholder 6">
+          <p:cNvPr id="9" name="Text Placeholder Number 03">
             <a:extLst>
               <a:ext uri="{FF2B5EF4-FFF2-40B4-BE49-F238E27FC236}">
                 <a16:creationId xmlns:a16="http://schemas.microsoft.com/office/drawing/2014/main" id="{867C06B3-86F3-BA14-C074-170923D252F1}"/>
@@ -4994,16 +5010,16 @@
           <a:p>
             <a:pPr lvl="0"/>
             <a:r>
-              <a:rPr lang="en-US" altLang="zh-CN"/>
+              <a:rPr lang="en-US" altLang="zh-CN" dirty="0"/>
               <a:t>03</a:t>
             </a:r>
-            <a:endParaRPr lang="zh-CN" altLang="en-US"/>
-          </a:p>
-        </p:txBody>
-      </p:sp>
-      <p:sp>
-        <p:nvSpPr>
-          <p:cNvPr id="49" name="Text Placeholder 10">
+            <a:endParaRPr lang="zh-CN" altLang="en-US" dirty="0"/>
+          </a:p>
+        </p:txBody>
+      </p:sp>
+      <p:sp>
+        <p:nvSpPr>
+          <p:cNvPr id="49" name="Text Placeholder Title 3">
             <a:extLst>
               <a:ext uri="{FF2B5EF4-FFF2-40B4-BE49-F238E27FC236}">
                 <a16:creationId xmlns:a16="http://schemas.microsoft.com/office/drawing/2014/main" id="{C7E3638A-E47B-2C16-051A-8CB00B9F895C}"/>
@@ -5095,7 +5111,7 @@
       </p:sp>
       <p:sp>
         <p:nvSpPr>
-          <p:cNvPr id="48" name="Text Placeholder 10">
+          <p:cNvPr id="48" name="Text Placeholder Content 3">
             <a:extLst>
               <a:ext uri="{FF2B5EF4-FFF2-40B4-BE49-F238E27FC236}">
                 <a16:creationId xmlns:a16="http://schemas.microsoft.com/office/drawing/2014/main" id="{5A4CC468-3A85-49F0-099C-BC1F0F566DC3}"/>
@@ -5202,7 +5218,7 @@
       </p:sp>
       <p:sp>
         <p:nvSpPr>
-          <p:cNvPr id="23" name="Rectangle 89">
+          <p:cNvPr id="23" name="Rectangle 4">
             <a:extLst>
               <a:ext uri="{FF2B5EF4-FFF2-40B4-BE49-F238E27FC236}">
                 <a16:creationId xmlns:a16="http://schemas.microsoft.com/office/drawing/2014/main" id="{B592A1D3-2017-F169-B0A7-3173FF77C1A7}"/>
@@ -5342,7 +5358,7 @@
       </p:sp>
       <p:sp>
         <p:nvSpPr>
-          <p:cNvPr id="15" name="Text Placeholder 6">
+          <p:cNvPr id="15" name="Text Placeholder Number 04">
             <a:extLst>
               <a:ext uri="{FF2B5EF4-FFF2-40B4-BE49-F238E27FC236}">
                 <a16:creationId xmlns:a16="http://schemas.microsoft.com/office/drawing/2014/main" id="{2E5F3B0A-2795-1AB7-EDA7-048B8FFC1801}"/>
@@ -5390,7 +5406,7 @@
       </p:sp>
       <p:sp>
         <p:nvSpPr>
-          <p:cNvPr id="51" name="Text Placeholder 10">
+          <p:cNvPr id="51" name="Text Placeholder Title 4">
             <a:extLst>
               <a:ext uri="{FF2B5EF4-FFF2-40B4-BE49-F238E27FC236}">
                 <a16:creationId xmlns:a16="http://schemas.microsoft.com/office/drawing/2014/main" id="{0F680350-5C6D-05CD-2861-1CBCFF6E39DA}"/>
@@ -5482,7 +5498,7 @@
       </p:sp>
       <p:sp>
         <p:nvSpPr>
-          <p:cNvPr id="50" name="Text Placeholder 10">
+          <p:cNvPr id="50" name="Text Placeholder Content 4">
             <a:extLst>
               <a:ext uri="{FF2B5EF4-FFF2-40B4-BE49-F238E27FC236}">
                 <a16:creationId xmlns:a16="http://schemas.microsoft.com/office/drawing/2014/main" id="{66541D57-A12D-E924-D596-DE278CD7F4D7}"/>
@@ -5589,7 +5605,7 @@
       </p:sp>
       <p:sp>
         <p:nvSpPr>
-          <p:cNvPr id="22" name="Rectangle 81">
+          <p:cNvPr id="22" name="Rectangle 5">
             <a:extLst>
               <a:ext uri="{FF2B5EF4-FFF2-40B4-BE49-F238E27FC236}">
                 <a16:creationId xmlns:a16="http://schemas.microsoft.com/office/drawing/2014/main" id="{E8A6C772-C164-3CEA-A046-D9723CBD9FC6}"/>
@@ -5729,7 +5745,7 @@
       </p:sp>
       <p:sp>
         <p:nvSpPr>
-          <p:cNvPr id="14" name="Text Placeholder 6">
+          <p:cNvPr id="14" name="Text Placeholder Number 05">
             <a:extLst>
               <a:ext uri="{FF2B5EF4-FFF2-40B4-BE49-F238E27FC236}">
                 <a16:creationId xmlns:a16="http://schemas.microsoft.com/office/drawing/2014/main" id="{E73C2B03-4A5F-AABA-EC88-7F080083184F}"/>
@@ -5777,7 +5793,7 @@
       </p:sp>
       <p:sp>
         <p:nvSpPr>
-          <p:cNvPr id="46" name="Text Placeholder 10">
+          <p:cNvPr id="46" name="Text Placeholder Title 5">
             <a:extLst>
               <a:ext uri="{FF2B5EF4-FFF2-40B4-BE49-F238E27FC236}">
                 <a16:creationId xmlns:a16="http://schemas.microsoft.com/office/drawing/2014/main" id="{9EBEE5F4-6259-F130-927E-7FFB60A40FD6}"/>
@@ -5869,7 +5885,7 @@
       </p:sp>
       <p:sp>
         <p:nvSpPr>
-          <p:cNvPr id="45" name="Text Placeholder 10">
+          <p:cNvPr id="45" name="Text Placeholder Content 5">
             <a:extLst>
               <a:ext uri="{FF2B5EF4-FFF2-40B4-BE49-F238E27FC236}">
                 <a16:creationId xmlns:a16="http://schemas.microsoft.com/office/drawing/2014/main" id="{66237AC4-EBD4-DD9E-69D9-8D385F6C75A6}"/>
@@ -5976,7 +5992,7 @@
       </p:sp>
       <p:sp>
         <p:nvSpPr>
-          <p:cNvPr id="21" name="Rectangle 56">
+          <p:cNvPr id="21" name="Rectangle 6">
             <a:extLst>
               <a:ext uri="{FF2B5EF4-FFF2-40B4-BE49-F238E27FC236}">
                 <a16:creationId xmlns:a16="http://schemas.microsoft.com/office/drawing/2014/main" id="{3C5137EE-3743-D56F-8A63-2370A4C0D4E1}"/>
@@ -6116,7 +6132,7 @@
       </p:sp>
       <p:sp>
         <p:nvSpPr>
-          <p:cNvPr id="13" name="Text Placeholder 6">
+          <p:cNvPr id="13" name="Text Placeholder Number 06">
             <a:extLst>
               <a:ext uri="{FF2B5EF4-FFF2-40B4-BE49-F238E27FC236}">
                 <a16:creationId xmlns:a16="http://schemas.microsoft.com/office/drawing/2014/main" id="{5DB5C80C-26F8-0C95-154F-6DEEEDB32371}"/>
@@ -6164,7 +6180,7 @@
       </p:sp>
       <p:sp>
         <p:nvSpPr>
-          <p:cNvPr id="41" name="Text Placeholder 10">
+          <p:cNvPr id="41" name="Text Placeholder Title 6">
             <a:extLst>
               <a:ext uri="{FF2B5EF4-FFF2-40B4-BE49-F238E27FC236}">
                 <a16:creationId xmlns:a16="http://schemas.microsoft.com/office/drawing/2014/main" id="{1580A2FB-D18E-CCE5-D7D5-AB29B0225C05}"/>
@@ -7994,7 +8010,7 @@
       </p:sp>
       <p:sp>
         <p:nvSpPr>
-          <p:cNvPr id="26" name="Text Placeholder 21">
+          <p:cNvPr id="26" name="Text Placeholder Bottom Right">
             <a:extLst>
               <a:ext uri="{FF2B5EF4-FFF2-40B4-BE49-F238E27FC236}">
                 <a16:creationId xmlns:a16="http://schemas.microsoft.com/office/drawing/2014/main" id="{42E77249-2175-C589-1BF1-E79E0635473A}"/>
@@ -8062,7 +8078,7 @@
       </p:sp>
       <p:sp>
         <p:nvSpPr>
-          <p:cNvPr id="27" name="Text Placeholder 21">
+          <p:cNvPr id="27" name="Text Placeholder Top Right">
             <a:extLst>
               <a:ext uri="{FF2B5EF4-FFF2-40B4-BE49-F238E27FC236}">
                 <a16:creationId xmlns:a16="http://schemas.microsoft.com/office/drawing/2014/main" id="{51628B60-961D-665B-F6C3-732491D38BB9}"/>
@@ -8130,7 +8146,7 @@
       </p:sp>
       <p:sp>
         <p:nvSpPr>
-          <p:cNvPr id="28" name="Text Placeholder 21">
+          <p:cNvPr id="28" name="Text Placeholder Bottom Left">
             <a:extLst>
               <a:ext uri="{FF2B5EF4-FFF2-40B4-BE49-F238E27FC236}">
                 <a16:creationId xmlns:a16="http://schemas.microsoft.com/office/drawing/2014/main" id="{D751D188-82D0-B381-C234-7DD4F5EB595C}"/>
@@ -8198,7 +8214,7 @@
       </p:sp>
       <p:sp>
         <p:nvSpPr>
-          <p:cNvPr id="29" name="Text Placeholder 21">
+          <p:cNvPr id="29" name="Text Placeholder Top Left">
             <a:extLst>
               <a:ext uri="{FF2B5EF4-FFF2-40B4-BE49-F238E27FC236}">
                 <a16:creationId xmlns:a16="http://schemas.microsoft.com/office/drawing/2014/main" id="{B0A5CF0E-F4A4-002B-E8F8-28011639E48A}"/>

</xml_diff>

<commit_message>
Fix structured frontmatter column layout processing and add template validation
- Fix missing layout patterns for Three Columns With Titles, Three Columns, and Four Columns
- Add comprehensive template validation system with specific error messages
- Update template analyzer to detect duplicate placeholder names and naming inconsistencies
- Add Mac-specific instructions for PowerPoint template editing
- Update template JSON with corrected placeholder names for Four Columns layouts
- Template validation now shows exact fixes needed in specific layouts

🤖 Generated with [Claude Code](https://claude.ai/code)

Co-Authored-By: Claude <noreply@anthropic.com>
</commit_message>
<xml_diff>
--- a/assets/templates/default.pptx
+++ b/assets/templates/default.pptx
@@ -1571,7 +1571,7 @@
       </p:sp>
       <p:sp>
         <p:nvSpPr>
-          <p:cNvPr id="18" name="Col 1 Text Placeholder 5">
+          <p:cNvPr id="18" name="Col 2 Text Placeholder 5">
             <a:extLst>
               <a:ext uri="{FF2B5EF4-FFF2-40B4-BE49-F238E27FC236}">
                 <a16:creationId xmlns:a16="http://schemas.microsoft.com/office/drawing/2014/main" id="{3243E739-7F7F-7D90-BE91-2AD0ED2AACF7}"/>
@@ -1647,7 +1647,7 @@
       </p:sp>
       <p:sp>
         <p:nvSpPr>
-          <p:cNvPr id="20" name="Col 1 Text Placeholder 7">
+          <p:cNvPr id="20" name="Col 3 Text Placeholder 7">
             <a:extLst>
               <a:ext uri="{FF2B5EF4-FFF2-40B4-BE49-F238E27FC236}">
                 <a16:creationId xmlns:a16="http://schemas.microsoft.com/office/drawing/2014/main" id="{46D4B212-27B2-3CDE-4333-250AB6ED6943}"/>
@@ -1723,7 +1723,7 @@
       </p:sp>
       <p:sp>
         <p:nvSpPr>
-          <p:cNvPr id="22" name="Col 1 Text Placeholder 9">
+          <p:cNvPr id="22" name="Col 4 Text Placeholder 9">
             <a:extLst>
               <a:ext uri="{FF2B5EF4-FFF2-40B4-BE49-F238E27FC236}">
                 <a16:creationId xmlns:a16="http://schemas.microsoft.com/office/drawing/2014/main" id="{C35A8091-5AA2-245D-989D-83E80FA1E6B3}"/>
@@ -10873,6 +10873,22 @@
       </a:lvl9pPr>
     </p:otherStyle>
   </p:txStyles>
+  <p:extLst>
+    <p:ext uri="{27BBF7A9-308A-43DC-89C8-2F10F3537804}">
+      <p15:sldGuideLst xmlns:p15="http://schemas.microsoft.com/office/powerpoint/2012/main">
+        <p15:guide id="1" orient="horz" pos="2160" userDrawn="1">
+          <p15:clr>
+            <a:srgbClr val="F26B43"/>
+          </p15:clr>
+        </p15:guide>
+        <p15:guide id="2" pos="3840" userDrawn="1">
+          <p15:clr>
+            <a:srgbClr val="F26B43"/>
+          </p15:clr>
+        </p15:guide>
+      </p15:sldGuideLst>
+    </p:ext>
+  </p:extLst>
 </p:sldMaster>
 </file>
 

</xml_diff>